<commit_message>
hacking ppt almost done
</commit_message>
<xml_diff>
--- a/Metasploit.pptx
+++ b/Metasploit.pptx
@@ -4,6 +4,9 @@
   <p:sldMasterIdLst>
     <p:sldMasterId id="2147483648" r:id="rId1"/>
   </p:sldMasterIdLst>
+  <p:notesMasterIdLst>
+    <p:notesMasterId r:id="rId3"/>
+  </p:notesMasterIdLst>
   <p:sldIdLst>
     <p:sldId id="258" r:id="rId2"/>
   </p:sldIdLst>
@@ -104,7 +107,446 @@
       </a:defRPr>
     </a:lvl9pPr>
   </p:defaultTextStyle>
+  <p:extLst>
+    <p:ext uri="{EFAFB233-063F-42B5-8137-9DF3F51BA10A}">
+      <p15:sldGuideLst xmlns:p15="http://schemas.microsoft.com/office/powerpoint/2012/main"/>
+    </p:ext>
+  </p:extLst>
 </p:presentation>
+</file>
+
+<file path=ppt/notesMasters/notesMaster1.xml><?xml version="1.0" encoding="utf-8"?>
+<p:notesMaster xmlns:a="http://schemas.openxmlformats.org/drawingml/2006/main" xmlns:r="http://schemas.openxmlformats.org/officeDocument/2006/relationships" xmlns:p="http://schemas.openxmlformats.org/presentationml/2006/main">
+  <p:cSld>
+    <p:bg>
+      <p:bgRef idx="1001">
+        <a:schemeClr val="bg1"/>
+      </p:bgRef>
+    </p:bg>
+    <p:spTree>
+      <p:nvGrpSpPr>
+        <p:cNvPr id="1" name=""/>
+        <p:cNvGrpSpPr/>
+        <p:nvPr/>
+      </p:nvGrpSpPr>
+      <p:grpSpPr>
+        <a:xfrm>
+          <a:off x="0" y="0"/>
+          <a:ext cx="0" cy="0"/>
+          <a:chOff x="0" y="0"/>
+          <a:chExt cx="0" cy="0"/>
+        </a:xfrm>
+      </p:grpSpPr>
+      <p:sp>
+        <p:nvSpPr>
+          <p:cNvPr id="2" name="Header Placeholder 1"/>
+          <p:cNvSpPr>
+            <a:spLocks noGrp="1"/>
+          </p:cNvSpPr>
+          <p:nvPr>
+            <p:ph type="hdr" sz="quarter"/>
+          </p:nvPr>
+        </p:nvSpPr>
+        <p:spPr>
+          <a:xfrm>
+            <a:off x="0" y="0"/>
+            <a:ext cx="2971800" cy="458788"/>
+          </a:xfrm>
+          <a:prstGeom prst="rect">
+            <a:avLst/>
+          </a:prstGeom>
+        </p:spPr>
+        <p:txBody>
+          <a:bodyPr vert="horz" lIns="91440" tIns="45720" rIns="91440" bIns="45720" rtlCol="0"/>
+          <a:lstStyle>
+            <a:lvl1pPr algn="l">
+              <a:defRPr sz="1200"/>
+            </a:lvl1pPr>
+          </a:lstStyle>
+          <a:p>
+            <a:endParaRPr lang="en-US"/>
+          </a:p>
+        </p:txBody>
+      </p:sp>
+      <p:sp>
+        <p:nvSpPr>
+          <p:cNvPr id="3" name="Date Placeholder 2"/>
+          <p:cNvSpPr>
+            <a:spLocks noGrp="1"/>
+          </p:cNvSpPr>
+          <p:nvPr>
+            <p:ph type="dt" idx="1"/>
+          </p:nvPr>
+        </p:nvSpPr>
+        <p:spPr>
+          <a:xfrm>
+            <a:off x="3884613" y="0"/>
+            <a:ext cx="2971800" cy="458788"/>
+          </a:xfrm>
+          <a:prstGeom prst="rect">
+            <a:avLst/>
+          </a:prstGeom>
+        </p:spPr>
+        <p:txBody>
+          <a:bodyPr vert="horz" lIns="91440" tIns="45720" rIns="91440" bIns="45720" rtlCol="0"/>
+          <a:lstStyle>
+            <a:lvl1pPr algn="r">
+              <a:defRPr sz="1200"/>
+            </a:lvl1pPr>
+          </a:lstStyle>
+          <a:p>
+            <a:fld id="{780D03CD-C28F-6D4F-8549-6E228DCCDA39}" type="datetimeFigureOut">
+              <a:rPr lang="en-US" smtClean="0"/>
+              <a:t>2/26/18</a:t>
+            </a:fld>
+            <a:endParaRPr lang="en-US"/>
+          </a:p>
+        </p:txBody>
+      </p:sp>
+      <p:sp>
+        <p:nvSpPr>
+          <p:cNvPr id="4" name="Slide Image Placeholder 3"/>
+          <p:cNvSpPr>
+            <a:spLocks noGrp="1" noRot="1" noChangeAspect="1"/>
+          </p:cNvSpPr>
+          <p:nvPr>
+            <p:ph type="sldImg" idx="2"/>
+          </p:nvPr>
+        </p:nvSpPr>
+        <p:spPr>
+          <a:xfrm>
+            <a:off x="685800" y="1143000"/>
+            <a:ext cx="5486400" cy="3086100"/>
+          </a:xfrm>
+          <a:prstGeom prst="rect">
+            <a:avLst/>
+          </a:prstGeom>
+          <a:noFill/>
+          <a:ln w="12700">
+            <a:solidFill>
+              <a:prstClr val="black"/>
+            </a:solidFill>
+          </a:ln>
+        </p:spPr>
+        <p:txBody>
+          <a:bodyPr vert="horz" lIns="91440" tIns="45720" rIns="91440" bIns="45720" rtlCol="0" anchor="ctr"/>
+          <a:lstStyle/>
+          <a:p>
+            <a:endParaRPr lang="en-US"/>
+          </a:p>
+        </p:txBody>
+      </p:sp>
+      <p:sp>
+        <p:nvSpPr>
+          <p:cNvPr id="5" name="Notes Placeholder 4"/>
+          <p:cNvSpPr>
+            <a:spLocks noGrp="1"/>
+          </p:cNvSpPr>
+          <p:nvPr>
+            <p:ph type="body" sz="quarter" idx="3"/>
+          </p:nvPr>
+        </p:nvSpPr>
+        <p:spPr>
+          <a:xfrm>
+            <a:off x="685800" y="4400550"/>
+            <a:ext cx="5486400" cy="3600450"/>
+          </a:xfrm>
+          <a:prstGeom prst="rect">
+            <a:avLst/>
+          </a:prstGeom>
+        </p:spPr>
+        <p:txBody>
+          <a:bodyPr vert="horz" lIns="91440" tIns="45720" rIns="91440" bIns="45720" rtlCol="0"/>
+          <a:lstStyle/>
+          <a:p>
+            <a:pPr lvl="0"/>
+            <a:r>
+              <a:rPr lang="en-CA" smtClean="0"/>
+              <a:t>Click to edit Master text styles</a:t>
+            </a:r>
+          </a:p>
+          <a:p>
+            <a:pPr lvl="1"/>
+            <a:r>
+              <a:rPr lang="en-CA" smtClean="0"/>
+              <a:t>Second level</a:t>
+            </a:r>
+          </a:p>
+          <a:p>
+            <a:pPr lvl="2"/>
+            <a:r>
+              <a:rPr lang="en-CA" smtClean="0"/>
+              <a:t>Third level</a:t>
+            </a:r>
+          </a:p>
+          <a:p>
+            <a:pPr lvl="3"/>
+            <a:r>
+              <a:rPr lang="en-CA" smtClean="0"/>
+              <a:t>Fourth level</a:t>
+            </a:r>
+          </a:p>
+          <a:p>
+            <a:pPr lvl="4"/>
+            <a:r>
+              <a:rPr lang="en-CA" smtClean="0"/>
+              <a:t>Fifth level</a:t>
+            </a:r>
+            <a:endParaRPr lang="en-US"/>
+          </a:p>
+        </p:txBody>
+      </p:sp>
+      <p:sp>
+        <p:nvSpPr>
+          <p:cNvPr id="6" name="Footer Placeholder 5"/>
+          <p:cNvSpPr>
+            <a:spLocks noGrp="1"/>
+          </p:cNvSpPr>
+          <p:nvPr>
+            <p:ph type="ftr" sz="quarter" idx="4"/>
+          </p:nvPr>
+        </p:nvSpPr>
+        <p:spPr>
+          <a:xfrm>
+            <a:off x="0" y="8685213"/>
+            <a:ext cx="2971800" cy="458787"/>
+          </a:xfrm>
+          <a:prstGeom prst="rect">
+            <a:avLst/>
+          </a:prstGeom>
+        </p:spPr>
+        <p:txBody>
+          <a:bodyPr vert="horz" lIns="91440" tIns="45720" rIns="91440" bIns="45720" rtlCol="0" anchor="b"/>
+          <a:lstStyle>
+            <a:lvl1pPr algn="l">
+              <a:defRPr sz="1200"/>
+            </a:lvl1pPr>
+          </a:lstStyle>
+          <a:p>
+            <a:endParaRPr lang="en-US"/>
+          </a:p>
+        </p:txBody>
+      </p:sp>
+      <p:sp>
+        <p:nvSpPr>
+          <p:cNvPr id="7" name="Slide Number Placeholder 6"/>
+          <p:cNvSpPr>
+            <a:spLocks noGrp="1"/>
+          </p:cNvSpPr>
+          <p:nvPr>
+            <p:ph type="sldNum" sz="quarter" idx="5"/>
+          </p:nvPr>
+        </p:nvSpPr>
+        <p:spPr>
+          <a:xfrm>
+            <a:off x="3884613" y="8685213"/>
+            <a:ext cx="2971800" cy="458787"/>
+          </a:xfrm>
+          <a:prstGeom prst="rect">
+            <a:avLst/>
+          </a:prstGeom>
+        </p:spPr>
+        <p:txBody>
+          <a:bodyPr vert="horz" lIns="91440" tIns="45720" rIns="91440" bIns="45720" rtlCol="0" anchor="b"/>
+          <a:lstStyle>
+            <a:lvl1pPr algn="r">
+              <a:defRPr sz="1200"/>
+            </a:lvl1pPr>
+          </a:lstStyle>
+          <a:p>
+            <a:fld id="{C19B0A1B-48A2-F643-9653-5690602A1647}" type="slidenum">
+              <a:rPr lang="en-US" smtClean="0"/>
+              <a:t>‹#›</a:t>
+            </a:fld>
+            <a:endParaRPr lang="en-US"/>
+          </a:p>
+        </p:txBody>
+      </p:sp>
+    </p:spTree>
+    <p:extLst>
+      <p:ext uri="{BB962C8B-B14F-4D97-AF65-F5344CB8AC3E}">
+        <p14:creationId xmlns:p14="http://schemas.microsoft.com/office/powerpoint/2010/main" val="129834447"/>
+      </p:ext>
+    </p:extLst>
+  </p:cSld>
+  <p:clrMap bg1="lt1" tx1="dk1" bg2="lt2" tx2="dk2" accent1="accent1" accent2="accent2" accent3="accent3" accent4="accent4" accent5="accent5" accent6="accent6" hlink="hlink" folHlink="folHlink"/>
+  <p:notesStyle>
+    <a:lvl1pPr marL="0" algn="l" defTabSz="914400" rtl="0" eaLnBrk="1" latinLnBrk="0" hangingPunct="1">
+      <a:defRPr sz="1200" kern="1200">
+        <a:solidFill>
+          <a:schemeClr val="tx1"/>
+        </a:solidFill>
+        <a:latin typeface="+mn-lt"/>
+        <a:ea typeface="+mn-ea"/>
+        <a:cs typeface="+mn-cs"/>
+      </a:defRPr>
+    </a:lvl1pPr>
+    <a:lvl2pPr marL="457200" algn="l" defTabSz="914400" rtl="0" eaLnBrk="1" latinLnBrk="0" hangingPunct="1">
+      <a:defRPr sz="1200" kern="1200">
+        <a:solidFill>
+          <a:schemeClr val="tx1"/>
+        </a:solidFill>
+        <a:latin typeface="+mn-lt"/>
+        <a:ea typeface="+mn-ea"/>
+        <a:cs typeface="+mn-cs"/>
+      </a:defRPr>
+    </a:lvl2pPr>
+    <a:lvl3pPr marL="914400" algn="l" defTabSz="914400" rtl="0" eaLnBrk="1" latinLnBrk="0" hangingPunct="1">
+      <a:defRPr sz="1200" kern="1200">
+        <a:solidFill>
+          <a:schemeClr val="tx1"/>
+        </a:solidFill>
+        <a:latin typeface="+mn-lt"/>
+        <a:ea typeface="+mn-ea"/>
+        <a:cs typeface="+mn-cs"/>
+      </a:defRPr>
+    </a:lvl3pPr>
+    <a:lvl4pPr marL="1371600" algn="l" defTabSz="914400" rtl="0" eaLnBrk="1" latinLnBrk="0" hangingPunct="1">
+      <a:defRPr sz="1200" kern="1200">
+        <a:solidFill>
+          <a:schemeClr val="tx1"/>
+        </a:solidFill>
+        <a:latin typeface="+mn-lt"/>
+        <a:ea typeface="+mn-ea"/>
+        <a:cs typeface="+mn-cs"/>
+      </a:defRPr>
+    </a:lvl4pPr>
+    <a:lvl5pPr marL="1828800" algn="l" defTabSz="914400" rtl="0" eaLnBrk="1" latinLnBrk="0" hangingPunct="1">
+      <a:defRPr sz="1200" kern="1200">
+        <a:solidFill>
+          <a:schemeClr val="tx1"/>
+        </a:solidFill>
+        <a:latin typeface="+mn-lt"/>
+        <a:ea typeface="+mn-ea"/>
+        <a:cs typeface="+mn-cs"/>
+      </a:defRPr>
+    </a:lvl5pPr>
+    <a:lvl6pPr marL="2286000" algn="l" defTabSz="914400" rtl="0" eaLnBrk="1" latinLnBrk="0" hangingPunct="1">
+      <a:defRPr sz="1200" kern="1200">
+        <a:solidFill>
+          <a:schemeClr val="tx1"/>
+        </a:solidFill>
+        <a:latin typeface="+mn-lt"/>
+        <a:ea typeface="+mn-ea"/>
+        <a:cs typeface="+mn-cs"/>
+      </a:defRPr>
+    </a:lvl6pPr>
+    <a:lvl7pPr marL="2743200" algn="l" defTabSz="914400" rtl="0" eaLnBrk="1" latinLnBrk="0" hangingPunct="1">
+      <a:defRPr sz="1200" kern="1200">
+        <a:solidFill>
+          <a:schemeClr val="tx1"/>
+        </a:solidFill>
+        <a:latin typeface="+mn-lt"/>
+        <a:ea typeface="+mn-ea"/>
+        <a:cs typeface="+mn-cs"/>
+      </a:defRPr>
+    </a:lvl7pPr>
+    <a:lvl8pPr marL="3200400" algn="l" defTabSz="914400" rtl="0" eaLnBrk="1" latinLnBrk="0" hangingPunct="1">
+      <a:defRPr sz="1200" kern="1200">
+        <a:solidFill>
+          <a:schemeClr val="tx1"/>
+        </a:solidFill>
+        <a:latin typeface="+mn-lt"/>
+        <a:ea typeface="+mn-ea"/>
+        <a:cs typeface="+mn-cs"/>
+      </a:defRPr>
+    </a:lvl8pPr>
+    <a:lvl9pPr marL="3657600" algn="l" defTabSz="914400" rtl="0" eaLnBrk="1" latinLnBrk="0" hangingPunct="1">
+      <a:defRPr sz="1200" kern="1200">
+        <a:solidFill>
+          <a:schemeClr val="tx1"/>
+        </a:solidFill>
+        <a:latin typeface="+mn-lt"/>
+        <a:ea typeface="+mn-ea"/>
+        <a:cs typeface="+mn-cs"/>
+      </a:defRPr>
+    </a:lvl9pPr>
+  </p:notesStyle>
+</p:notesMaster>
+</file>
+
+<file path=ppt/notesSlides/notesSlide1.xml><?xml version="1.0" encoding="utf-8"?>
+<p:notes xmlns:a="http://schemas.openxmlformats.org/drawingml/2006/main" xmlns:r="http://schemas.openxmlformats.org/officeDocument/2006/relationships" xmlns:p="http://schemas.openxmlformats.org/presentationml/2006/main">
+  <p:cSld>
+    <p:spTree>
+      <p:nvGrpSpPr>
+        <p:cNvPr id="1" name=""/>
+        <p:cNvGrpSpPr/>
+        <p:nvPr/>
+      </p:nvGrpSpPr>
+      <p:grpSpPr>
+        <a:xfrm>
+          <a:off x="0" y="0"/>
+          <a:ext cx="0" cy="0"/>
+          <a:chOff x="0" y="0"/>
+          <a:chExt cx="0" cy="0"/>
+        </a:xfrm>
+      </p:grpSpPr>
+      <p:sp>
+        <p:nvSpPr>
+          <p:cNvPr id="2" name="Slide Image Placeholder 1"/>
+          <p:cNvSpPr>
+            <a:spLocks noGrp="1" noRot="1" noChangeAspect="1"/>
+          </p:cNvSpPr>
+          <p:nvPr>
+            <p:ph type="sldImg"/>
+          </p:nvPr>
+        </p:nvSpPr>
+        <p:spPr/>
+      </p:sp>
+      <p:sp>
+        <p:nvSpPr>
+          <p:cNvPr id="3" name="Notes Placeholder 2"/>
+          <p:cNvSpPr>
+            <a:spLocks noGrp="1"/>
+          </p:cNvSpPr>
+          <p:nvPr>
+            <p:ph type="body" idx="1"/>
+          </p:nvPr>
+        </p:nvSpPr>
+        <p:spPr/>
+        <p:txBody>
+          <a:bodyPr/>
+          <a:lstStyle/>
+          <a:p>
+            <a:endParaRPr lang="en-US" dirty="0"/>
+          </a:p>
+        </p:txBody>
+      </p:sp>
+      <p:sp>
+        <p:nvSpPr>
+          <p:cNvPr id="4" name="Slide Number Placeholder 3"/>
+          <p:cNvSpPr>
+            <a:spLocks noGrp="1"/>
+          </p:cNvSpPr>
+          <p:nvPr>
+            <p:ph type="sldNum" sz="quarter" idx="10"/>
+          </p:nvPr>
+        </p:nvSpPr>
+        <p:spPr/>
+        <p:txBody>
+          <a:bodyPr/>
+          <a:lstStyle/>
+          <a:p>
+            <a:fld id="{C19B0A1B-48A2-F643-9653-5690602A1647}" type="slidenum">
+              <a:rPr lang="en-US" smtClean="0"/>
+              <a:t>1</a:t>
+            </a:fld>
+            <a:endParaRPr lang="en-US"/>
+          </a:p>
+        </p:txBody>
+      </p:sp>
+    </p:spTree>
+    <p:extLst>
+      <p:ext uri="{BB962C8B-B14F-4D97-AF65-F5344CB8AC3E}">
+        <p14:creationId xmlns:p14="http://schemas.microsoft.com/office/powerpoint/2010/main" val="177332700"/>
+      </p:ext>
+    </p:extLst>
+  </p:cSld>
+  <p:clrMapOvr>
+    <a:masterClrMapping/>
+  </p:clrMapOvr>
+</p:notes>
 </file>
 
 <file path=ppt/slideLayouts/slideLayout1.xml><?xml version="1.0" encoding="utf-8"?>
@@ -238,7 +680,7 @@
           <a:p>
             <a:fld id="{84C96F59-D577-FA43-AC56-D4CAF65691F2}" type="datetimeFigureOut">
               <a:rPr lang="en-US" smtClean="0"/>
-              <a:t>2/23/18</a:t>
+              <a:t>2/26/18</a:t>
             </a:fld>
             <a:endParaRPr lang="en-US"/>
           </a:p>
@@ -408,7 +850,7 @@
           <a:p>
             <a:fld id="{84C96F59-D577-FA43-AC56-D4CAF65691F2}" type="datetimeFigureOut">
               <a:rPr lang="en-US" smtClean="0"/>
-              <a:t>2/23/18</a:t>
+              <a:t>2/26/18</a:t>
             </a:fld>
             <a:endParaRPr lang="en-US"/>
           </a:p>
@@ -588,7 +1030,7 @@
           <a:p>
             <a:fld id="{84C96F59-D577-FA43-AC56-D4CAF65691F2}" type="datetimeFigureOut">
               <a:rPr lang="en-US" smtClean="0"/>
-              <a:t>2/23/18</a:t>
+              <a:t>2/26/18</a:t>
             </a:fld>
             <a:endParaRPr lang="en-US"/>
           </a:p>
@@ -758,7 +1200,7 @@
           <a:p>
             <a:fld id="{84C96F59-D577-FA43-AC56-D4CAF65691F2}" type="datetimeFigureOut">
               <a:rPr lang="en-US" smtClean="0"/>
-              <a:t>2/23/18</a:t>
+              <a:t>2/26/18</a:t>
             </a:fld>
             <a:endParaRPr lang="en-US"/>
           </a:p>
@@ -1004,7 +1446,7 @@
           <a:p>
             <a:fld id="{84C96F59-D577-FA43-AC56-D4CAF65691F2}" type="datetimeFigureOut">
               <a:rPr lang="en-US" smtClean="0"/>
-              <a:t>2/23/18</a:t>
+              <a:t>2/26/18</a:t>
             </a:fld>
             <a:endParaRPr lang="en-US"/>
           </a:p>
@@ -1236,7 +1678,7 @@
           <a:p>
             <a:fld id="{84C96F59-D577-FA43-AC56-D4CAF65691F2}" type="datetimeFigureOut">
               <a:rPr lang="en-US" smtClean="0"/>
-              <a:t>2/23/18</a:t>
+              <a:t>2/26/18</a:t>
             </a:fld>
             <a:endParaRPr lang="en-US"/>
           </a:p>
@@ -1603,7 +2045,7 @@
           <a:p>
             <a:fld id="{84C96F59-D577-FA43-AC56-D4CAF65691F2}" type="datetimeFigureOut">
               <a:rPr lang="en-US" smtClean="0"/>
-              <a:t>2/23/18</a:t>
+              <a:t>2/26/18</a:t>
             </a:fld>
             <a:endParaRPr lang="en-US"/>
           </a:p>
@@ -1721,7 +2163,7 @@
           <a:p>
             <a:fld id="{84C96F59-D577-FA43-AC56-D4CAF65691F2}" type="datetimeFigureOut">
               <a:rPr lang="en-US" smtClean="0"/>
-              <a:t>2/23/18</a:t>
+              <a:t>2/26/18</a:t>
             </a:fld>
             <a:endParaRPr lang="en-US"/>
           </a:p>
@@ -1816,7 +2258,7 @@
           <a:p>
             <a:fld id="{84C96F59-D577-FA43-AC56-D4CAF65691F2}" type="datetimeFigureOut">
               <a:rPr lang="en-US" smtClean="0"/>
-              <a:t>2/23/18</a:t>
+              <a:t>2/26/18</a:t>
             </a:fld>
             <a:endParaRPr lang="en-US"/>
           </a:p>
@@ -2093,7 +2535,7 @@
           <a:p>
             <a:fld id="{84C96F59-D577-FA43-AC56-D4CAF65691F2}" type="datetimeFigureOut">
               <a:rPr lang="en-US" smtClean="0"/>
-              <a:t>2/23/18</a:t>
+              <a:t>2/26/18</a:t>
             </a:fld>
             <a:endParaRPr lang="en-US"/>
           </a:p>
@@ -2346,7 +2788,7 @@
           <a:p>
             <a:fld id="{84C96F59-D577-FA43-AC56-D4CAF65691F2}" type="datetimeFigureOut">
               <a:rPr lang="en-US" smtClean="0"/>
-              <a:t>2/23/18</a:t>
+              <a:t>2/26/18</a:t>
             </a:fld>
             <a:endParaRPr lang="en-US"/>
           </a:p>
@@ -2559,7 +3001,7 @@
           <a:p>
             <a:fld id="{84C96F59-D577-FA43-AC56-D4CAF65691F2}" type="datetimeFigureOut">
               <a:rPr lang="en-US" smtClean="0"/>
-              <a:t>2/23/18</a:t>
+              <a:t>2/26/18</a:t>
             </a:fld>
             <a:endParaRPr lang="en-US"/>
           </a:p>
@@ -3070,7 +3512,7 @@
         </p:nvGrpSpPr>
         <p:grpSpPr>
           <a:xfrm>
-            <a:off x="-5488245" y="0"/>
+            <a:off x="-5288550" y="0"/>
             <a:ext cx="11364686" cy="6858000"/>
             <a:chOff x="498898" y="0"/>
             <a:chExt cx="11364686" cy="6858000"/>
@@ -3258,8 +3700,8 @@
           </p:nvSpPr>
           <p:spPr>
             <a:xfrm>
-              <a:off x="5595257" y="1142999"/>
-              <a:ext cx="4245429" cy="3970318"/>
+              <a:off x="5589789" y="1033743"/>
+              <a:ext cx="4245429" cy="5570756"/>
             </a:xfrm>
             <a:prstGeom prst="rect">
               <a:avLst/>
@@ -3273,7 +3715,7 @@
             <a:lstStyle/>
             <a:p>
               <a:r>
-                <a:rPr lang="en-US" dirty="0" smtClean="0">
+                <a:rPr lang="en-US" sz="2000" b="1" dirty="0" smtClean="0">
                   <a:solidFill>
                     <a:schemeClr val="bg1"/>
                   </a:solidFill>
@@ -3281,11 +3723,11 @@
                   <a:ea typeface="Tw Cen MT" charset="0"/>
                   <a:cs typeface="Tw Cen MT" charset="0"/>
                 </a:rPr>
-                <a:t>What is MetaSploit?</a:t>
+                <a:t>BACKGROUND</a:t>
               </a:r>
             </a:p>
             <a:p>
-              <a:endParaRPr lang="en-US" dirty="0">
+              <a:endParaRPr lang="en-US" sz="1400" dirty="0">
                 <a:solidFill>
                   <a:schemeClr val="bg1"/>
                 </a:solidFill>
@@ -3293,42 +3735,6 @@
                 <a:ea typeface="Tw Cen MT" charset="0"/>
                 <a:cs typeface="Tw Cen MT" charset="0"/>
               </a:endParaRPr>
-            </a:p>
-            <a:p>
-              <a:r>
-                <a:rPr lang="en-US" dirty="0" smtClean="0">
-                  <a:solidFill>
-                    <a:schemeClr val="bg1"/>
-                  </a:solidFill>
-                  <a:latin typeface="Tw Cen MT" charset="0"/>
-                  <a:ea typeface="Tw Cen MT" charset="0"/>
-                  <a:cs typeface="Tw Cen MT" charset="0"/>
-                </a:rPr>
-                <a:t>MetaSploit is a framework that provides several tools to check the security of a system. It comes pre-installed in Kali-Linux.</a:t>
-              </a:r>
-            </a:p>
-            <a:p>
-              <a:endParaRPr lang="en-US" dirty="0">
-                <a:solidFill>
-                  <a:schemeClr val="bg1"/>
-                </a:solidFill>
-                <a:latin typeface="Tw Cen MT" charset="0"/>
-                <a:ea typeface="Tw Cen MT" charset="0"/>
-                <a:cs typeface="Tw Cen MT" charset="0"/>
-              </a:endParaRPr>
-            </a:p>
-            <a:p>
-              <a:r>
-                <a:rPr lang="en-US" dirty="0" smtClean="0">
-                  <a:solidFill>
-                    <a:schemeClr val="bg1"/>
-                  </a:solidFill>
-                  <a:latin typeface="Tw Cen MT" charset="0"/>
-                  <a:ea typeface="Tw Cen MT" charset="0"/>
-                  <a:cs typeface="Tw Cen MT" charset="0"/>
-                </a:rPr>
-                <a:t>Types of Modules in MetaSploit :</a:t>
-              </a:r>
             </a:p>
             <a:p>
               <a:pPr marL="285750" indent="-285750">
@@ -3344,8 +3750,62 @@
                   <a:ea typeface="Tw Cen MT" charset="0"/>
                   <a:cs typeface="Tw Cen MT" charset="0"/>
                 </a:rPr>
-                <a:t>Exploits</a:t>
+                <a:t>In Oct 2003, DEFCON, </a:t>
               </a:r>
+              <a:r>
+                <a:rPr lang="en-US" b="1" dirty="0" smtClean="0">
+                  <a:solidFill>
+                    <a:schemeClr val="bg1"/>
+                  </a:solidFill>
+                  <a:latin typeface="Tw Cen MT" charset="0"/>
+                  <a:ea typeface="Tw Cen MT" charset="0"/>
+                  <a:cs typeface="Tw Cen MT" charset="0"/>
+                </a:rPr>
+                <a:t>Metasploit 1.0 </a:t>
+              </a:r>
+              <a:r>
+                <a:rPr lang="en-US" dirty="0" smtClean="0">
+                  <a:solidFill>
+                    <a:schemeClr val="bg1"/>
+                  </a:solidFill>
+                  <a:latin typeface="Tw Cen MT" charset="0"/>
+                  <a:ea typeface="Tw Cen MT" charset="0"/>
+                  <a:cs typeface="Tw Cen MT" charset="0"/>
+                </a:rPr>
+                <a:t>was released with 11 exploits by </a:t>
+              </a:r>
+              <a:r>
+                <a:rPr lang="en-US" b="1" dirty="0" smtClean="0">
+                  <a:solidFill>
+                    <a:schemeClr val="bg1"/>
+                  </a:solidFill>
+                  <a:latin typeface="Tw Cen MT" charset="0"/>
+                  <a:ea typeface="Tw Cen MT" charset="0"/>
+                  <a:cs typeface="Tw Cen MT" charset="0"/>
+                </a:rPr>
+                <a:t>H.D Moore</a:t>
+              </a:r>
+              <a:r>
+                <a:rPr lang="en-US" dirty="0" smtClean="0">
+                  <a:solidFill>
+                    <a:schemeClr val="bg1"/>
+                  </a:solidFill>
+                  <a:latin typeface="Tw Cen MT" charset="0"/>
+                  <a:ea typeface="Tw Cen MT" charset="0"/>
+                  <a:cs typeface="Tw Cen MT" charset="0"/>
+                </a:rPr>
+                <a:t>.</a:t>
+              </a:r>
+            </a:p>
+            <a:p>
+              <a:endParaRPr lang="en-US" dirty="0" smtClean="0">
+                <a:solidFill>
+                  <a:schemeClr val="bg1"/>
+                </a:solidFill>
+                <a:latin typeface="Tw Cen MT" charset="0"/>
+                <a:ea typeface="Tw Cen MT" charset="0"/>
+                <a:cs typeface="Tw Cen MT" charset="0"/>
+              </a:endParaRPr>
             </a:p>
             <a:p>
               <a:pPr marL="285750" indent="-285750">
@@ -3361,8 +3821,18 @@
                   <a:ea typeface="Tw Cen MT" charset="0"/>
                   <a:cs typeface="Tw Cen MT" charset="0"/>
                 </a:rPr>
-                <a:t>Auxiliary</a:t>
+                <a:t>H.D. Moore created Metasploit as a portable network tool using Perl</a:t>
               </a:r>
+            </a:p>
+            <a:p>
+              <a:endParaRPr lang="en-US" dirty="0" smtClean="0">
+                <a:solidFill>
+                  <a:schemeClr val="bg1"/>
+                </a:solidFill>
+                <a:latin typeface="Tw Cen MT" charset="0"/>
+                <a:ea typeface="Tw Cen MT" charset="0"/>
+                <a:cs typeface="Tw Cen MT" charset="0"/>
+              </a:endParaRPr>
             </a:p>
             <a:p>
               <a:pPr marL="285750" indent="-285750">
@@ -3378,8 +3848,89 @@
                   <a:ea typeface="Tw Cen MT" charset="0"/>
                   <a:cs typeface="Tw Cen MT" charset="0"/>
                 </a:rPr>
-                <a:t>Post</a:t>
+                <a:t>Was completely re-written in Ruby 2007</a:t>
               </a:r>
+            </a:p>
+            <a:p>
+              <a:endParaRPr lang="en-US" dirty="0" smtClean="0">
+                <a:solidFill>
+                  <a:schemeClr val="bg1"/>
+                </a:solidFill>
+                <a:latin typeface="Tw Cen MT" charset="0"/>
+                <a:ea typeface="Tw Cen MT" charset="0"/>
+                <a:cs typeface="Tw Cen MT" charset="0"/>
+              </a:endParaRPr>
+            </a:p>
+            <a:p>
+              <a:pPr marL="285750" indent="-285750">
+                <a:buFont typeface="Arial" charset="0"/>
+                <a:buChar char="•"/>
+              </a:pPr>
+              <a:r>
+                <a:rPr lang="en-US" dirty="0">
+                  <a:solidFill>
+                    <a:schemeClr val="bg1"/>
+                  </a:solidFill>
+                  <a:latin typeface="Tw Cen MT" charset="0"/>
+                  <a:ea typeface="Tw Cen MT" charset="0"/>
+                  <a:cs typeface="Tw Cen MT" charset="0"/>
+                </a:rPr>
+                <a:t>I</a:t>
+              </a:r>
+              <a:r>
+                <a:rPr lang="en-US" dirty="0" smtClean="0">
+                  <a:solidFill>
+                    <a:schemeClr val="bg1"/>
+                  </a:solidFill>
+                  <a:latin typeface="Tw Cen MT" charset="0"/>
+                  <a:ea typeface="Tw Cen MT" charset="0"/>
+                  <a:cs typeface="Tw Cen MT" charset="0"/>
+                </a:rPr>
+                <a:t>n 2009, it was acquired </a:t>
+              </a:r>
+              <a:r>
+                <a:rPr lang="en-US" dirty="0">
+                  <a:solidFill>
+                    <a:schemeClr val="bg1"/>
+                  </a:solidFill>
+                  <a:latin typeface="Tw Cen MT" charset="0"/>
+                  <a:ea typeface="Tw Cen MT" charset="0"/>
+                  <a:cs typeface="Tw Cen MT" charset="0"/>
+                </a:rPr>
+                <a:t>by </a:t>
+              </a:r>
+              <a:r>
+                <a:rPr lang="en-US" b="1" dirty="0" smtClean="0">
+                  <a:solidFill>
+                    <a:schemeClr val="bg1"/>
+                  </a:solidFill>
+                  <a:latin typeface="Tw Cen MT" charset="0"/>
+                  <a:ea typeface="Tw Cen MT" charset="0"/>
+                  <a:cs typeface="Tw Cen MT" charset="0"/>
+                </a:rPr>
+                <a:t>Rapid7, </a:t>
+              </a:r>
+              <a:r>
+                <a:rPr lang="en-US" dirty="0" smtClean="0">
+                  <a:solidFill>
+                    <a:schemeClr val="bg1"/>
+                  </a:solidFill>
+                  <a:latin typeface="Tw Cen MT" charset="0"/>
+                  <a:ea typeface="Tw Cen MT" charset="0"/>
+                  <a:cs typeface="Tw Cen MT" charset="0"/>
+                </a:rPr>
+                <a:t>a security company that provides unified vulnerability management solutions. </a:t>
+              </a:r>
+            </a:p>
+            <a:p>
+              <a:endParaRPr lang="en-US" dirty="0" smtClean="0">
+                <a:solidFill>
+                  <a:schemeClr val="bg1"/>
+                </a:solidFill>
+                <a:latin typeface="Tw Cen MT" charset="0"/>
+                <a:ea typeface="Tw Cen MT" charset="0"/>
+                <a:cs typeface="Tw Cen MT" charset="0"/>
+              </a:endParaRPr>
             </a:p>
             <a:p>
               <a:pPr marL="285750" indent="-285750">
@@ -3395,14 +3946,8 @@
                   <a:ea typeface="Tw Cen MT" charset="0"/>
                   <a:cs typeface="Tw Cen MT" charset="0"/>
                 </a:rPr>
-                <a:t>Payloads</a:t>
+                <a:t>Remains open source </a:t>
               </a:r>
-            </a:p>
-            <a:p>
-              <a:pPr marL="285750" indent="-285750">
-                <a:buFont typeface="Arial" charset="0"/>
-                <a:buChar char="•"/>
-              </a:pPr>
               <a:r>
                 <a:rPr lang="en-US" dirty="0" smtClean="0">
                   <a:solidFill>
@@ -3411,26 +3956,60 @@
                   <a:latin typeface="Tw Cen MT" charset="0"/>
                   <a:ea typeface="Tw Cen MT" charset="0"/>
                   <a:cs typeface="Tw Cen MT" charset="0"/>
+                  <a:sym typeface="Wingdings"/>
                 </a:rPr>
-                <a:t>Encoders</a:t>
+                <a:t></a:t>
               </a:r>
+              <a:endParaRPr lang="en-US" dirty="0">
+                <a:solidFill>
+                  <a:schemeClr val="bg1"/>
+                </a:solidFill>
+                <a:latin typeface="Tw Cen MT" charset="0"/>
+                <a:ea typeface="Tw Cen MT" charset="0"/>
+                <a:cs typeface="Tw Cen MT" charset="0"/>
+              </a:endParaRPr>
             </a:p>
             <a:p>
               <a:pPr marL="285750" indent="-285750">
                 <a:buFont typeface="Arial" charset="0"/>
                 <a:buChar char="•"/>
               </a:pPr>
-              <a:r>
-                <a:rPr lang="en-US" dirty="0" smtClean="0">
-                  <a:solidFill>
-                    <a:schemeClr val="bg1"/>
-                  </a:solidFill>
-                  <a:latin typeface="Tw Cen MT" charset="0"/>
-                  <a:ea typeface="Tw Cen MT" charset="0"/>
-                  <a:cs typeface="Tw Cen MT" charset="0"/>
-                </a:rPr>
-                <a:t>Nops</a:t>
-              </a:r>
+              <a:endParaRPr lang="en-US" sz="1600" dirty="0" smtClean="0">
+                <a:solidFill>
+                  <a:schemeClr val="bg1"/>
+                </a:solidFill>
+                <a:latin typeface="Tw Cen MT" charset="0"/>
+                <a:ea typeface="Tw Cen MT" charset="0"/>
+                <a:cs typeface="Tw Cen MT" charset="0"/>
+              </a:endParaRPr>
+            </a:p>
+            <a:p>
+              <a:pPr marL="285750" indent="-285750">
+                <a:buFont typeface="Arial" charset="0"/>
+                <a:buChar char="•"/>
+              </a:pPr>
+              <a:endParaRPr lang="en-US" sz="1600" dirty="0" smtClean="0">
+                <a:solidFill>
+                  <a:schemeClr val="bg1"/>
+                </a:solidFill>
+                <a:latin typeface="Tw Cen MT" charset="0"/>
+                <a:ea typeface="Tw Cen MT" charset="0"/>
+                <a:cs typeface="Tw Cen MT" charset="0"/>
+              </a:endParaRPr>
+            </a:p>
+            <a:p>
+              <a:pPr marL="285750" indent="-285750">
+                <a:buFont typeface="Arial" charset="0"/>
+                <a:buChar char="•"/>
+              </a:pPr>
+              <a:endParaRPr lang="en-US" sz="1600" b="1" dirty="0" smtClean="0">
+                <a:solidFill>
+                  <a:schemeClr val="bg1"/>
+                </a:solidFill>
+                <a:latin typeface="Tw Cen MT" charset="0"/>
+                <a:ea typeface="Tw Cen MT" charset="0"/>
+                <a:cs typeface="Tw Cen MT" charset="0"/>
+              </a:endParaRPr>
             </a:p>
             <a:p>
               <a:pPr marL="342900" indent="-342900">
@@ -3457,7 +4036,7 @@
         </p:nvGrpSpPr>
         <p:grpSpPr>
           <a:xfrm>
-            <a:off x="-6489730" y="0"/>
+            <a:off x="-6096486" y="7694"/>
             <a:ext cx="11364686" cy="6858000"/>
             <a:chOff x="-502587" y="0"/>
             <a:chExt cx="11364686" cy="6858000"/>
@@ -3624,14 +4203,6 @@
                     </a:rPr>
                     <a:t>2</a:t>
                   </a:r>
-                  <a:endParaRPr lang="en-US" sz="2600" b="1" dirty="0">
-                    <a:solidFill>
-                      <a:srgbClr val="C8C7A8"/>
-                    </a:solidFill>
-                    <a:latin typeface="Calibri" charset="0"/>
-                    <a:ea typeface="Calibri" charset="0"/>
-                    <a:cs typeface="Calibri" charset="0"/>
-                  </a:endParaRPr>
                 </a:p>
               </p:txBody>
             </p:sp>
@@ -3645,8 +4216,8 @@
           </p:nvSpPr>
           <p:spPr>
             <a:xfrm>
-              <a:off x="4517571" y="947057"/>
-              <a:ext cx="4767943" cy="3139321"/>
+              <a:off x="4930819" y="921197"/>
+              <a:ext cx="4245496" cy="4062651"/>
             </a:xfrm>
             <a:prstGeom prst="rect">
               <a:avLst/>
@@ -3660,25 +4231,21 @@
             <a:lstStyle/>
             <a:p>
               <a:r>
-                <a:rPr lang="en-US" dirty="0" smtClean="0">
+                <a:rPr lang="en-US" sz="2000" b="1" dirty="0">
                   <a:solidFill>
-                    <a:schemeClr val="accent2">
-                      <a:lumMod val="75000"/>
-                    </a:schemeClr>
+                    <a:srgbClr val="C55A2C"/>
                   </a:solidFill>
                   <a:latin typeface="Tw Cen MT" charset="0"/>
                   <a:ea typeface="Tw Cen MT" charset="0"/>
                   <a:cs typeface="Tw Cen MT" charset="0"/>
                 </a:rPr>
-                <a:t>How can we use MetaSploit?</a:t>
+                <a:t>What is MetaSploit?</a:t>
               </a:r>
             </a:p>
             <a:p>
               <a:endParaRPr lang="en-US" dirty="0">
                 <a:solidFill>
-                  <a:schemeClr val="accent2">
-                    <a:lumMod val="75000"/>
-                  </a:schemeClr>
+                  <a:srgbClr val="C55A2C"/>
                 </a:solidFill>
                 <a:latin typeface="Tw Cen MT" charset="0"/>
                 <a:ea typeface="Tw Cen MT" charset="0"/>
@@ -3687,25 +4254,62 @@
             </a:p>
             <a:p>
               <a:r>
-                <a:rPr lang="en-US" dirty="0" smtClean="0">
+                <a:rPr lang="en-US" dirty="0">
                   <a:solidFill>
-                    <a:schemeClr val="accent2">
-                      <a:lumMod val="75000"/>
-                    </a:schemeClr>
+                    <a:srgbClr val="C55A2C"/>
                   </a:solidFill>
                   <a:latin typeface="Tw Cen MT" charset="0"/>
                   <a:ea typeface="Tw Cen MT" charset="0"/>
                   <a:cs typeface="Tw Cen MT" charset="0"/>
                 </a:rPr>
-                <a:t>MetaSploit comes in pre-installed in Kali Linux Machine which is an environment used by the Penetration testers to check the vulnerabilities of a system. </a:t>
+                <a:t>MetaSploit is a framework that provides several tools to </a:t>
               </a:r>
+              <a:r>
+                <a:rPr lang="en-US" dirty="0" smtClean="0">
+                  <a:solidFill>
+                    <a:srgbClr val="C55A2C"/>
+                  </a:solidFill>
+                  <a:latin typeface="Tw Cen MT" charset="0"/>
+                  <a:ea typeface="Tw Cen MT" charset="0"/>
+                  <a:cs typeface="Tw Cen MT" charset="0"/>
+                </a:rPr>
+                <a:t>test the </a:t>
+              </a:r>
+              <a:r>
+                <a:rPr lang="en-US" dirty="0">
+                  <a:solidFill>
+                    <a:srgbClr val="C55A2C"/>
+                  </a:solidFill>
+                  <a:latin typeface="Tw Cen MT" charset="0"/>
+                  <a:ea typeface="Tw Cen MT" charset="0"/>
+                  <a:cs typeface="Tw Cen MT" charset="0"/>
+                </a:rPr>
+                <a:t>security of a system. </a:t>
+              </a:r>
+              <a:r>
+                <a:rPr lang="en-US" dirty="0" smtClean="0">
+                  <a:solidFill>
+                    <a:srgbClr val="C55A2C"/>
+                  </a:solidFill>
+                  <a:latin typeface="Tw Cen MT" charset="0"/>
+                  <a:ea typeface="Tw Cen MT" charset="0"/>
+                  <a:cs typeface="Tw Cen MT" charset="0"/>
+                </a:rPr>
+                <a:t>It also provides an environment that can be used to develop your own exploits.</a:t>
+              </a:r>
+              <a:endParaRPr lang="en-US" dirty="0">
+                <a:solidFill>
+                  <a:srgbClr val="C55A2C"/>
+                </a:solidFill>
+                <a:latin typeface="Tw Cen MT" charset="0"/>
+                <a:ea typeface="Tw Cen MT" charset="0"/>
+                <a:cs typeface="Tw Cen MT" charset="0"/>
+              </a:endParaRPr>
             </a:p>
             <a:p>
-              <a:endParaRPr lang="en-US" dirty="0">
+              <a:endParaRPr lang="en-US" dirty="0" smtClean="0">
                 <a:solidFill>
-                  <a:schemeClr val="accent2">
-                    <a:lumMod val="75000"/>
-                  </a:schemeClr>
+                  <a:srgbClr val="C55A2C"/>
                 </a:solidFill>
                 <a:latin typeface="Tw Cen MT" charset="0"/>
                 <a:ea typeface="Tw Cen MT" charset="0"/>
@@ -3714,17 +4318,15 @@
             </a:p>
             <a:p>
               <a:r>
-                <a:rPr lang="en-US" dirty="0" smtClean="0">
+                <a:rPr lang="en-US" dirty="0">
                   <a:solidFill>
-                    <a:schemeClr val="accent2">
-                      <a:lumMod val="75000"/>
-                    </a:schemeClr>
+                    <a:srgbClr val="C55A2C"/>
                   </a:solidFill>
                   <a:latin typeface="Tw Cen MT" charset="0"/>
                   <a:ea typeface="Tw Cen MT" charset="0"/>
                   <a:cs typeface="Tw Cen MT" charset="0"/>
                 </a:rPr>
-                <a:t>Two most popular ways of using metasploit are :</a:t>
+                <a:t>Types of Modules in MetaSploit :</a:t>
               </a:r>
             </a:p>
             <a:p>
@@ -3733,30 +4335,15 @@
                 <a:buChar char="•"/>
               </a:pPr>
               <a:r>
-                <a:rPr lang="en-US" b="1" dirty="0" smtClean="0">
+                <a:rPr lang="en-US" dirty="0">
                   <a:solidFill>
-                    <a:schemeClr val="accent2">
-                      <a:lumMod val="75000"/>
-                    </a:schemeClr>
+                    <a:srgbClr val="C55A2C"/>
                   </a:solidFill>
                   <a:latin typeface="Tw Cen MT" charset="0"/>
                   <a:ea typeface="Tw Cen MT" charset="0"/>
                   <a:cs typeface="Tw Cen MT" charset="0"/>
                 </a:rPr>
-                <a:t>Msfconsole </a:t>
-              </a:r>
-              <a:r>
-                <a:rPr lang="en-US" dirty="0" smtClean="0">
-                  <a:solidFill>
-                    <a:schemeClr val="accent2">
-                      <a:lumMod val="75000"/>
-                    </a:schemeClr>
-                  </a:solidFill>
-                  <a:latin typeface="Tw Cen MT" charset="0"/>
-                  <a:ea typeface="Tw Cen MT" charset="0"/>
-                  <a:cs typeface="Tw Cen MT" charset="0"/>
-                </a:rPr>
-                <a:t>: Provides command line environment to use metasploit</a:t>
+                <a:t>Exploits</a:t>
               </a:r>
             </a:p>
             <a:p>
@@ -3765,36 +4352,87 @@
                 <a:buChar char="•"/>
               </a:pPr>
               <a:r>
-                <a:rPr lang="en-US" b="1" dirty="0" smtClean="0">
+                <a:rPr lang="en-US" dirty="0">
                   <a:solidFill>
-                    <a:schemeClr val="accent2">
-                      <a:lumMod val="75000"/>
-                    </a:schemeClr>
+                    <a:srgbClr val="C55A2C"/>
                   </a:solidFill>
                   <a:latin typeface="Tw Cen MT" charset="0"/>
                   <a:ea typeface="Tw Cen MT" charset="0"/>
                   <a:cs typeface="Tw Cen MT" charset="0"/>
                 </a:rPr>
-                <a:t>Armitage </a:t>
+                <a:t>Auxiliary</a:t>
               </a:r>
+            </a:p>
+            <a:p>
+              <a:pPr marL="285750" indent="-285750">
+                <a:buFont typeface="Arial" charset="0"/>
+                <a:buChar char="•"/>
+              </a:pPr>
               <a:r>
-                <a:rPr lang="en-US" dirty="0" smtClean="0">
+                <a:rPr lang="en-US" dirty="0">
                   <a:solidFill>
-                    <a:schemeClr val="accent2">
-                      <a:lumMod val="75000"/>
-                    </a:schemeClr>
+                    <a:srgbClr val="C55A2C"/>
                   </a:solidFill>
                   <a:latin typeface="Tw Cen MT" charset="0"/>
                   <a:ea typeface="Tw Cen MT" charset="0"/>
                   <a:cs typeface="Tw Cen MT" charset="0"/>
                 </a:rPr>
-                <a:t>: Provides Graphic user interface</a:t>
+                <a:t>Post</a:t>
               </a:r>
-              <a:endParaRPr lang="en-US" b="1" dirty="0">
+            </a:p>
+            <a:p>
+              <a:pPr marL="285750" indent="-285750">
+                <a:buFont typeface="Arial" charset="0"/>
+                <a:buChar char="•"/>
+              </a:pPr>
+              <a:r>
+                <a:rPr lang="en-US" dirty="0">
+                  <a:solidFill>
+                    <a:srgbClr val="C55A2C"/>
+                  </a:solidFill>
+                  <a:latin typeface="Tw Cen MT" charset="0"/>
+                  <a:ea typeface="Tw Cen MT" charset="0"/>
+                  <a:cs typeface="Tw Cen MT" charset="0"/>
+                </a:rPr>
+                <a:t>Payloads</a:t>
+              </a:r>
+            </a:p>
+            <a:p>
+              <a:pPr marL="285750" indent="-285750">
+                <a:buFont typeface="Arial" charset="0"/>
+                <a:buChar char="•"/>
+              </a:pPr>
+              <a:r>
+                <a:rPr lang="en-US" dirty="0">
+                  <a:solidFill>
+                    <a:srgbClr val="C55A2C"/>
+                  </a:solidFill>
+                  <a:latin typeface="Tw Cen MT" charset="0"/>
+                  <a:ea typeface="Tw Cen MT" charset="0"/>
+                  <a:cs typeface="Tw Cen MT" charset="0"/>
+                </a:rPr>
+                <a:t>Encoders</a:t>
+              </a:r>
+            </a:p>
+            <a:p>
+              <a:pPr marL="285750" indent="-285750">
+                <a:buFont typeface="Arial" charset="0"/>
+                <a:buChar char="•"/>
+              </a:pPr>
+              <a:r>
+                <a:rPr lang="en-US" dirty="0" smtClean="0">
+                  <a:solidFill>
+                    <a:srgbClr val="C55A2C"/>
+                  </a:solidFill>
+                  <a:latin typeface="Tw Cen MT" charset="0"/>
+                  <a:ea typeface="Tw Cen MT" charset="0"/>
+                  <a:cs typeface="Tw Cen MT" charset="0"/>
+                </a:rPr>
+                <a:t>Nops</a:t>
+              </a:r>
+              <a:endParaRPr lang="en-US" dirty="0">
                 <a:solidFill>
-                  <a:schemeClr val="accent2">
-                    <a:lumMod val="75000"/>
-                  </a:schemeClr>
+                  <a:srgbClr val="C55A2C"/>
                 </a:solidFill>
                 <a:latin typeface="Tw Cen MT" charset="0"/>
                 <a:ea typeface="Tw Cen MT" charset="0"/>
@@ -3812,7 +4450,7 @@
         </p:nvGrpSpPr>
         <p:grpSpPr>
           <a:xfrm>
-            <a:off x="-7436786" y="0"/>
+            <a:off x="-6911272" y="0"/>
             <a:ext cx="11364686" cy="6858000"/>
             <a:chOff x="-1449643" y="0"/>
             <a:chExt cx="11364686" cy="6858000"/>
@@ -3985,14 +4623,6 @@
                     </a:rPr>
                     <a:t>3</a:t>
                   </a:r>
-                  <a:endParaRPr lang="en-US" sz="2600" b="1" dirty="0">
-                    <a:solidFill>
-                      <a:srgbClr val="F8CCAE"/>
-                    </a:solidFill>
-                    <a:latin typeface="Calibri" charset="0"/>
-                    <a:ea typeface="Calibri" charset="0"/>
-                    <a:cs typeface="Calibri" charset="0"/>
-                  </a:endParaRPr>
                 </a:p>
               </p:txBody>
             </p:sp>
@@ -4006,8 +4636,8 @@
           </p:nvSpPr>
           <p:spPr>
             <a:xfrm>
-              <a:off x="4288971" y="2378520"/>
-              <a:ext cx="3429000" cy="1200329"/>
+              <a:off x="3796824" y="1033196"/>
+              <a:ext cx="4204926" cy="4308872"/>
             </a:xfrm>
             <a:prstGeom prst="rect">
               <a:avLst/>
@@ -4020,9 +4650,8 @@
             </a:bodyPr>
             <a:lstStyle/>
             <a:p>
-              <a:pPr algn="ctr"/>
               <a:r>
-                <a:rPr lang="en-US" sz="3600" dirty="0" smtClean="0">
+                <a:rPr lang="en-US" sz="2000" b="1" dirty="0" smtClean="0">
                   <a:solidFill>
                     <a:schemeClr val="accent2">
                       <a:lumMod val="75000"/>
@@ -4032,9 +4661,165 @@
                   <a:ea typeface="Tw Cen MT" charset="0"/>
                   <a:cs typeface="Tw Cen MT" charset="0"/>
                 </a:rPr>
-                <a:t>Some Infographic here</a:t>
+                <a:t>How </a:t>
               </a:r>
-              <a:endParaRPr lang="en-US" sz="3600" dirty="0">
+              <a:r>
+                <a:rPr lang="en-US" sz="2000" b="1" dirty="0">
+                  <a:solidFill>
+                    <a:schemeClr val="accent2">
+                      <a:lumMod val="75000"/>
+                    </a:schemeClr>
+                  </a:solidFill>
+                  <a:latin typeface="Tw Cen MT" charset="0"/>
+                  <a:ea typeface="Tw Cen MT" charset="0"/>
+                  <a:cs typeface="Tw Cen MT" charset="0"/>
+                </a:rPr>
+                <a:t>can we use MetaSploit?</a:t>
+              </a:r>
+            </a:p>
+            <a:p>
+              <a:endParaRPr lang="en-US" dirty="0">
+                <a:solidFill>
+                  <a:schemeClr val="accent2">
+                    <a:lumMod val="75000"/>
+                  </a:schemeClr>
+                </a:solidFill>
+                <a:latin typeface="Tw Cen MT" charset="0"/>
+                <a:ea typeface="Tw Cen MT" charset="0"/>
+                <a:cs typeface="Tw Cen MT" charset="0"/>
+              </a:endParaRPr>
+            </a:p>
+            <a:p>
+              <a:r>
+                <a:rPr lang="en-US" dirty="0">
+                  <a:solidFill>
+                    <a:schemeClr val="accent2">
+                      <a:lumMod val="75000"/>
+                    </a:schemeClr>
+                  </a:solidFill>
+                  <a:latin typeface="Tw Cen MT" charset="0"/>
+                  <a:ea typeface="Tw Cen MT" charset="0"/>
+                  <a:cs typeface="Tw Cen MT" charset="0"/>
+                </a:rPr>
+                <a:t>MetaSploit comes in pre-installed in Kali Linux Machine which is an environment used by the Penetration testers to check the vulnerabilities of a system. </a:t>
+              </a:r>
+            </a:p>
+            <a:p>
+              <a:pPr algn="ctr"/>
+              <a:endParaRPr lang="en-US" dirty="0" smtClean="0">
+                <a:solidFill>
+                  <a:schemeClr val="accent2">
+                    <a:lumMod val="75000"/>
+                  </a:schemeClr>
+                </a:solidFill>
+                <a:latin typeface="Tw Cen MT" charset="0"/>
+                <a:ea typeface="Tw Cen MT" charset="0"/>
+                <a:cs typeface="Tw Cen MT" charset="0"/>
+              </a:endParaRPr>
+            </a:p>
+            <a:p>
+              <a:endParaRPr lang="en-US" dirty="0">
+                <a:solidFill>
+                  <a:schemeClr val="accent2">
+                    <a:lumMod val="75000"/>
+                  </a:schemeClr>
+                </a:solidFill>
+                <a:latin typeface="Tw Cen MT" charset="0"/>
+                <a:ea typeface="Tw Cen MT" charset="0"/>
+                <a:cs typeface="Tw Cen MT" charset="0"/>
+              </a:endParaRPr>
+            </a:p>
+            <a:p>
+              <a:r>
+                <a:rPr lang="en-US" dirty="0">
+                  <a:solidFill>
+                    <a:schemeClr val="accent2">
+                      <a:lumMod val="75000"/>
+                    </a:schemeClr>
+                  </a:solidFill>
+                  <a:latin typeface="Tw Cen MT" charset="0"/>
+                  <a:ea typeface="Tw Cen MT" charset="0"/>
+                  <a:cs typeface="Tw Cen MT" charset="0"/>
+                </a:rPr>
+                <a:t>Two most popular ways of using metasploit are :</a:t>
+              </a:r>
+            </a:p>
+            <a:p>
+              <a:pPr marL="285750" indent="-285750">
+                <a:buFont typeface="Arial" charset="0"/>
+                <a:buChar char="•"/>
+              </a:pPr>
+              <a:r>
+                <a:rPr lang="en-US" b="1" dirty="0">
+                  <a:solidFill>
+                    <a:schemeClr val="accent2">
+                      <a:lumMod val="75000"/>
+                    </a:schemeClr>
+                  </a:solidFill>
+                  <a:latin typeface="Tw Cen MT" charset="0"/>
+                  <a:ea typeface="Tw Cen MT" charset="0"/>
+                  <a:cs typeface="Tw Cen MT" charset="0"/>
+                </a:rPr>
+                <a:t>Msfconsole </a:t>
+              </a:r>
+              <a:r>
+                <a:rPr lang="en-US" dirty="0">
+                  <a:solidFill>
+                    <a:schemeClr val="accent2">
+                      <a:lumMod val="75000"/>
+                    </a:schemeClr>
+                  </a:solidFill>
+                  <a:latin typeface="Tw Cen MT" charset="0"/>
+                  <a:ea typeface="Tw Cen MT" charset="0"/>
+                  <a:cs typeface="Tw Cen MT" charset="0"/>
+                </a:rPr>
+                <a:t>: Provides command line environment to use metasploit</a:t>
+              </a:r>
+            </a:p>
+            <a:p>
+              <a:pPr marL="285750" indent="-285750">
+                <a:buFont typeface="Arial" charset="0"/>
+                <a:buChar char="•"/>
+              </a:pPr>
+              <a:r>
+                <a:rPr lang="en-US" b="1" dirty="0">
+                  <a:solidFill>
+                    <a:schemeClr val="accent2">
+                      <a:lumMod val="75000"/>
+                    </a:schemeClr>
+                  </a:solidFill>
+                  <a:latin typeface="Tw Cen MT" charset="0"/>
+                  <a:ea typeface="Tw Cen MT" charset="0"/>
+                  <a:cs typeface="Tw Cen MT" charset="0"/>
+                </a:rPr>
+                <a:t>Armitage </a:t>
+              </a:r>
+              <a:r>
+                <a:rPr lang="en-US" dirty="0">
+                  <a:solidFill>
+                    <a:schemeClr val="accent2">
+                      <a:lumMod val="75000"/>
+                    </a:schemeClr>
+                  </a:solidFill>
+                  <a:latin typeface="Tw Cen MT" charset="0"/>
+                  <a:ea typeface="Tw Cen MT" charset="0"/>
+                  <a:cs typeface="Tw Cen MT" charset="0"/>
+                </a:rPr>
+                <a:t>: Provides Graphic user interface</a:t>
+              </a:r>
+              <a:endParaRPr lang="en-US" b="1" dirty="0">
+                <a:solidFill>
+                  <a:schemeClr val="accent2">
+                    <a:lumMod val="75000"/>
+                  </a:schemeClr>
+                </a:solidFill>
+                <a:latin typeface="Tw Cen MT" charset="0"/>
+                <a:ea typeface="Tw Cen MT" charset="0"/>
+                <a:cs typeface="Tw Cen MT" charset="0"/>
+              </a:endParaRPr>
+            </a:p>
+            <a:p>
+              <a:endParaRPr lang="en-US" sz="1600" dirty="0">
                 <a:solidFill>
                   <a:schemeClr val="accent2">
                     <a:lumMod val="75000"/>
@@ -4050,1433 +4835,20 @@
       </p:grpSp>
       <p:grpSp>
         <p:nvGrpSpPr>
-          <p:cNvPr id="104" name="Group 103"/>
-          <p:cNvGrpSpPr/>
-          <p:nvPr/>
-        </p:nvGrpSpPr>
-        <p:grpSpPr>
-          <a:xfrm>
-            <a:off x="-8372959" y="0"/>
-            <a:ext cx="11364686" cy="6858000"/>
-            <a:chOff x="-2385816" y="0"/>
-            <a:chExt cx="11364686" cy="6858000"/>
-          </a:xfrm>
-        </p:grpSpPr>
-        <p:grpSp>
-          <p:nvGrpSpPr>
-            <p:cNvPr id="105" name="Group 104"/>
-            <p:cNvGrpSpPr/>
-            <p:nvPr/>
-          </p:nvGrpSpPr>
-          <p:grpSpPr>
-            <a:xfrm>
-              <a:off x="-2385816" y="0"/>
-              <a:ext cx="11364686" cy="6858000"/>
-              <a:chOff x="-3004458" y="0"/>
-              <a:chExt cx="11364686" cy="6858000"/>
-            </a:xfrm>
-            <a:effectLst>
-              <a:outerShdw blurRad="254000" dist="88900" algn="l" rotWithShape="0">
-                <a:prstClr val="black">
-                  <a:alpha val="51000"/>
-                </a:prstClr>
-              </a:outerShdw>
-            </a:effectLst>
-          </p:grpSpPr>
-          <p:sp>
-            <p:nvSpPr>
-              <p:cNvPr id="138" name="Rectangle 137"/>
-              <p:cNvSpPr/>
-              <p:nvPr/>
-            </p:nvSpPr>
-            <p:spPr>
-              <a:xfrm>
-                <a:off x="-3004458" y="0"/>
-                <a:ext cx="10896600" cy="6858000"/>
-              </a:xfrm>
-              <a:prstGeom prst="rect">
-                <a:avLst/>
-              </a:prstGeom>
-              <a:solidFill>
-                <a:srgbClr val="FC9D99"/>
-              </a:solidFill>
-              <a:ln>
-                <a:noFill/>
-              </a:ln>
-            </p:spPr>
-            <p:style>
-              <a:lnRef idx="2">
-                <a:schemeClr val="accent1">
-                  <a:shade val="50000"/>
-                </a:schemeClr>
-              </a:lnRef>
-              <a:fillRef idx="1">
-                <a:schemeClr val="accent1"/>
-              </a:fillRef>
-              <a:effectRef idx="0">
-                <a:schemeClr val="accent1"/>
-              </a:effectRef>
-              <a:fontRef idx="minor">
-                <a:schemeClr val="lt1"/>
-              </a:fontRef>
-            </p:style>
-            <p:txBody>
-              <a:bodyPr rtlCol="0" anchor="ctr"/>
-              <a:lstStyle/>
-              <a:p>
-                <a:pPr algn="ctr"/>
-                <a:endParaRPr lang="en-US"/>
-              </a:p>
-            </p:txBody>
-          </p:sp>
-          <p:grpSp>
-            <p:nvGrpSpPr>
-              <p:cNvPr id="139" name="Group 138"/>
-              <p:cNvGrpSpPr/>
-              <p:nvPr/>
-            </p:nvGrpSpPr>
-            <p:grpSpPr>
-              <a:xfrm>
-                <a:off x="7892142" y="2607114"/>
-                <a:ext cx="468086" cy="555171"/>
-                <a:chOff x="10896600" y="3151414"/>
-                <a:chExt cx="468086" cy="555171"/>
-              </a:xfrm>
-              <a:solidFill>
-                <a:srgbClr val="FC9D99"/>
-              </a:solidFill>
-            </p:grpSpPr>
-            <p:sp>
-              <p:nvSpPr>
-                <p:cNvPr id="140" name="Round Same Side Corner Rectangle 139"/>
-                <p:cNvSpPr/>
-                <p:nvPr/>
-              </p:nvSpPr>
-              <p:spPr>
-                <a:xfrm rot="5400000">
-                  <a:off x="10853057" y="3194957"/>
-                  <a:ext cx="555171" cy="468086"/>
-                </a:xfrm>
-                <a:prstGeom prst="round2SameRect">
-                  <a:avLst/>
-                </a:prstGeom>
-                <a:grpFill/>
-                <a:ln>
-                  <a:noFill/>
-                </a:ln>
-              </p:spPr>
-              <p:style>
-                <a:lnRef idx="2">
-                  <a:schemeClr val="accent1">
-                    <a:shade val="50000"/>
-                  </a:schemeClr>
-                </a:lnRef>
-                <a:fillRef idx="1">
-                  <a:schemeClr val="accent1"/>
-                </a:fillRef>
-                <a:effectRef idx="0">
-                  <a:schemeClr val="accent1"/>
-                </a:effectRef>
-                <a:fontRef idx="minor">
-                  <a:schemeClr val="lt1"/>
-                </a:fontRef>
-              </p:style>
-              <p:txBody>
-                <a:bodyPr rtlCol="0" anchor="ctr"/>
-                <a:lstStyle/>
-                <a:p>
-                  <a:pPr algn="ctr"/>
-                  <a:endParaRPr lang="en-US"/>
-                </a:p>
-              </p:txBody>
-            </p:sp>
-            <p:sp>
-              <p:nvSpPr>
-                <p:cNvPr id="141" name="TextBox 140"/>
-                <p:cNvSpPr txBox="1"/>
-                <p:nvPr/>
-              </p:nvSpPr>
-              <p:spPr>
-                <a:xfrm>
-                  <a:off x="10972798" y="3167390"/>
-                  <a:ext cx="315687" cy="492443"/>
-                </a:xfrm>
-                <a:prstGeom prst="rect">
-                  <a:avLst/>
-                </a:prstGeom>
-                <a:grpFill/>
-              </p:spPr>
-              <p:txBody>
-                <a:bodyPr wrap="square" rtlCol="0">
-                  <a:spAutoFit/>
-                </a:bodyPr>
-                <a:lstStyle/>
-                <a:p>
-                  <a:r>
-                    <a:rPr lang="en-US" sz="2600" b="1" dirty="0">
-                      <a:solidFill>
-                        <a:srgbClr val="F4B183"/>
-                      </a:solidFill>
-                      <a:latin typeface="Calibri" charset="0"/>
-                      <a:ea typeface="Calibri" charset="0"/>
-                      <a:cs typeface="Calibri" charset="0"/>
-                    </a:rPr>
-                    <a:t>4</a:t>
-                  </a:r>
-                  <a:endParaRPr lang="en-US" sz="2600" b="1" dirty="0">
-                    <a:solidFill>
-                      <a:srgbClr val="F4B183"/>
-                    </a:solidFill>
-                    <a:latin typeface="Calibri" charset="0"/>
-                    <a:ea typeface="Calibri" charset="0"/>
-                    <a:cs typeface="Calibri" charset="0"/>
-                  </a:endParaRPr>
-                </a:p>
-              </p:txBody>
-            </p:sp>
-          </p:grpSp>
-        </p:grpSp>
-        <p:grpSp>
-          <p:nvGrpSpPr>
-            <p:cNvPr id="106" name="Group 105">
-              <a:extLst>
-                <a:ext uri="{FF2B5EF4-FFF2-40B4-BE49-F238E27FC236}">
-                  <a16:creationId xmlns:a16="http://schemas.microsoft.com/office/drawing/2014/main" xmlns="" id="{54D90FC1-753F-428C-A053-ED250592A43F}"/>
-                </a:ext>
-              </a:extLst>
-            </p:cNvPr>
-            <p:cNvGrpSpPr/>
-            <p:nvPr/>
-          </p:nvGrpSpPr>
-          <p:grpSpPr>
-            <a:xfrm>
-              <a:off x="3180437" y="2038652"/>
-              <a:ext cx="3458040" cy="2852863"/>
-              <a:chOff x="5330572" y="1501624"/>
-              <a:chExt cx="4796782" cy="4141358"/>
-            </a:xfrm>
-          </p:grpSpPr>
-          <p:sp>
-            <p:nvSpPr>
-              <p:cNvPr id="107" name="TextBox 106">
-                <a:extLst>
-                  <a:ext uri="{FF2B5EF4-FFF2-40B4-BE49-F238E27FC236}">
-                    <a16:creationId xmlns:a16="http://schemas.microsoft.com/office/drawing/2014/main" xmlns="" id="{3245EEAD-C921-4C46-8042-978B376C9EF0}"/>
-                  </a:ext>
-                </a:extLst>
-              </p:cNvPr>
-              <p:cNvSpPr txBox="1"/>
-              <p:nvPr/>
-            </p:nvSpPr>
-            <p:spPr>
-              <a:xfrm>
-                <a:off x="6698150" y="2994338"/>
-                <a:ext cx="2098757" cy="938246"/>
-              </a:xfrm>
-              <a:prstGeom prst="rect">
-                <a:avLst/>
-              </a:prstGeom>
-              <a:noFill/>
-            </p:spPr>
-            <p:txBody>
-              <a:bodyPr wrap="square" rtlCol="0">
-                <a:spAutoFit/>
-              </a:bodyPr>
-              <a:lstStyle/>
-              <a:p>
-                <a:pPr algn="ctr"/>
-                <a:r>
-                  <a:rPr lang="en-US" dirty="0">
-                    <a:solidFill>
-                      <a:schemeClr val="bg1"/>
-                    </a:solidFill>
-                    <a:latin typeface="Tw Cen MT" charset="0"/>
-                    <a:ea typeface="Tw Cen MT" charset="0"/>
-                    <a:cs typeface="Tw Cen MT" charset="0"/>
-                  </a:rPr>
-                  <a:t>YOUR CONTENT</a:t>
-                </a:r>
-              </a:p>
-            </p:txBody>
-          </p:sp>
-          <p:grpSp>
-            <p:nvGrpSpPr>
-              <p:cNvPr id="108" name="Group 107">
-                <a:extLst>
-                  <a:ext uri="{FF2B5EF4-FFF2-40B4-BE49-F238E27FC236}">
-                    <a16:creationId xmlns:a16="http://schemas.microsoft.com/office/drawing/2014/main" xmlns="" id="{4DAA23D9-5BCF-44D9-A046-B365684B49FF}"/>
-                  </a:ext>
-                </a:extLst>
-              </p:cNvPr>
-              <p:cNvGrpSpPr/>
-              <p:nvPr/>
-            </p:nvGrpSpPr>
-            <p:grpSpPr>
-              <a:xfrm>
-                <a:off x="5330572" y="1501624"/>
-                <a:ext cx="4796782" cy="4141358"/>
-                <a:chOff x="5330572" y="1501624"/>
-                <a:chExt cx="4796782" cy="4141358"/>
-              </a:xfrm>
-            </p:grpSpPr>
-            <p:sp>
-              <p:nvSpPr>
-                <p:cNvPr id="109" name="Circle: Hollow 4">
-                  <a:extLst>
-                    <a:ext uri="{FF2B5EF4-FFF2-40B4-BE49-F238E27FC236}">
-                      <a16:creationId xmlns:a16="http://schemas.microsoft.com/office/drawing/2014/main" xmlns="" id="{A017FAAF-FF88-4863-8525-D9CA8A62E522}"/>
-                    </a:ext>
-                  </a:extLst>
-                </p:cNvPr>
-                <p:cNvSpPr/>
-                <p:nvPr/>
-              </p:nvSpPr>
-              <p:spPr>
-                <a:xfrm>
-                  <a:off x="6414218" y="2173032"/>
-                  <a:ext cx="2648562" cy="2648562"/>
-                </a:xfrm>
-                <a:prstGeom prst="donut">
-                  <a:avLst>
-                    <a:gd name="adj" fmla="val 12685"/>
-                  </a:avLst>
-                </a:prstGeom>
-                <a:solidFill>
-                  <a:srgbClr val="84AF9B"/>
-                </a:solidFill>
-                <a:ln>
-                  <a:noFill/>
-                </a:ln>
-              </p:spPr>
-              <p:style>
-                <a:lnRef idx="2">
-                  <a:schemeClr val="accent1">
-                    <a:shade val="50000"/>
-                  </a:schemeClr>
-                </a:lnRef>
-                <a:fillRef idx="1">
-                  <a:schemeClr val="accent1"/>
-                </a:fillRef>
-                <a:effectRef idx="0">
-                  <a:schemeClr val="accent1"/>
-                </a:effectRef>
-                <a:fontRef idx="minor">
-                  <a:schemeClr val="lt1"/>
-                </a:fontRef>
-              </p:style>
-              <p:txBody>
-                <a:bodyPr rtlCol="0" anchor="ctr"/>
-                <a:lstStyle/>
-                <a:p>
-                  <a:pPr algn="ctr"/>
-                  <a:endParaRPr lang="en-US">
-                    <a:solidFill>
-                      <a:schemeClr val="tx1"/>
-                    </a:solidFill>
-                  </a:endParaRPr>
-                </a:p>
-              </p:txBody>
-            </p:sp>
-            <p:grpSp>
-              <p:nvGrpSpPr>
-                <p:cNvPr id="110" name="Group 109">
-                  <a:extLst>
-                    <a:ext uri="{FF2B5EF4-FFF2-40B4-BE49-F238E27FC236}">
-                      <a16:creationId xmlns:a16="http://schemas.microsoft.com/office/drawing/2014/main" xmlns="" id="{0BF12CF8-BAED-43AC-BCDF-1996B6C854C2}"/>
-                    </a:ext>
-                  </a:extLst>
-                </p:cNvPr>
-                <p:cNvGrpSpPr/>
-                <p:nvPr/>
-              </p:nvGrpSpPr>
-              <p:grpSpPr>
-                <a:xfrm>
-                  <a:off x="5330572" y="1501624"/>
-                  <a:ext cx="4796782" cy="4141358"/>
-                  <a:chOff x="5330572" y="1501624"/>
-                  <a:chExt cx="4796782" cy="4141358"/>
-                </a:xfrm>
-              </p:grpSpPr>
-              <p:sp>
-                <p:nvSpPr>
-                  <p:cNvPr id="111" name="Block Arc 110">
-                    <a:extLst>
-                      <a:ext uri="{FF2B5EF4-FFF2-40B4-BE49-F238E27FC236}">
-                        <a16:creationId xmlns:a16="http://schemas.microsoft.com/office/drawing/2014/main" xmlns="" id="{F82AF59A-BD4A-4028-AF5F-7A5D87B8602B}"/>
-                      </a:ext>
-                    </a:extLst>
-                  </p:cNvPr>
-                  <p:cNvSpPr/>
-                  <p:nvPr/>
-                </p:nvSpPr>
-                <p:spPr>
-                  <a:xfrm rot="17100000">
-                    <a:off x="6414218" y="2173032"/>
-                    <a:ext cx="2648562" cy="2648562"/>
-                  </a:xfrm>
-                  <a:prstGeom prst="blockArc">
-                    <a:avLst>
-                      <a:gd name="adj1" fmla="val 183959"/>
-                      <a:gd name="adj2" fmla="val 10321606"/>
-                      <a:gd name="adj3" fmla="val 12799"/>
-                    </a:avLst>
-                  </a:prstGeom>
-                  <a:solidFill>
-                    <a:srgbClr val="FF4266"/>
-                  </a:solidFill>
-                  <a:ln>
-                    <a:noFill/>
-                  </a:ln>
-                </p:spPr>
-                <p:style>
-                  <a:lnRef idx="2">
-                    <a:schemeClr val="accent1">
-                      <a:shade val="50000"/>
-                    </a:schemeClr>
-                  </a:lnRef>
-                  <a:fillRef idx="1">
-                    <a:schemeClr val="accent1"/>
-                  </a:fillRef>
-                  <a:effectRef idx="0">
-                    <a:schemeClr val="accent1"/>
-                  </a:effectRef>
-                  <a:fontRef idx="minor">
-                    <a:schemeClr val="lt1"/>
-                  </a:fontRef>
-                </p:style>
-                <p:txBody>
-                  <a:bodyPr rtlCol="0" anchor="ctr"/>
-                  <a:lstStyle/>
-                  <a:p>
-                    <a:pPr algn="ctr"/>
-                    <a:endParaRPr lang="en-US">
-                      <a:solidFill>
-                        <a:schemeClr val="tx1"/>
-                      </a:solidFill>
-                    </a:endParaRPr>
-                  </a:p>
-                </p:txBody>
-              </p:sp>
-              <p:sp>
-                <p:nvSpPr>
-                  <p:cNvPr id="112" name="Block Arc 111">
-                    <a:extLst>
-                      <a:ext uri="{FF2B5EF4-FFF2-40B4-BE49-F238E27FC236}">
-                        <a16:creationId xmlns:a16="http://schemas.microsoft.com/office/drawing/2014/main" xmlns="" id="{177D0E35-6D6C-4343-8127-E5E5351F59FE}"/>
-                      </a:ext>
-                    </a:extLst>
-                  </p:cNvPr>
-                  <p:cNvSpPr/>
-                  <p:nvPr/>
-                </p:nvSpPr>
-                <p:spPr>
-                  <a:xfrm>
-                    <a:off x="6407654" y="2173032"/>
-                    <a:ext cx="2648562" cy="2648562"/>
-                  </a:xfrm>
-                  <a:prstGeom prst="blockArc">
-                    <a:avLst>
-                      <a:gd name="adj1" fmla="val 5324802"/>
-                      <a:gd name="adj2" fmla="val 10321606"/>
-                      <a:gd name="adj3" fmla="val 12799"/>
-                    </a:avLst>
-                  </a:prstGeom>
-                  <a:solidFill>
-                    <a:srgbClr val="FC9D99"/>
-                  </a:solidFill>
-                  <a:ln>
-                    <a:noFill/>
-                  </a:ln>
-                </p:spPr>
-                <p:style>
-                  <a:lnRef idx="2">
-                    <a:schemeClr val="accent1">
-                      <a:shade val="50000"/>
-                    </a:schemeClr>
-                  </a:lnRef>
-                  <a:fillRef idx="1">
-                    <a:schemeClr val="accent1"/>
-                  </a:fillRef>
-                  <a:effectRef idx="0">
-                    <a:schemeClr val="accent1"/>
-                  </a:effectRef>
-                  <a:fontRef idx="minor">
-                    <a:schemeClr val="lt1"/>
-                  </a:fontRef>
-                </p:style>
-                <p:txBody>
-                  <a:bodyPr rtlCol="0" anchor="ctr"/>
-                  <a:lstStyle/>
-                  <a:p>
-                    <a:pPr algn="ctr"/>
-                    <a:endParaRPr lang="en-US">
-                      <a:solidFill>
-                        <a:schemeClr val="tx1"/>
-                      </a:solidFill>
-                    </a:endParaRPr>
-                  </a:p>
-                </p:txBody>
-              </p:sp>
-              <p:sp>
-                <p:nvSpPr>
-                  <p:cNvPr id="113" name="Block Arc 112">
-                    <a:extLst>
-                      <a:ext uri="{FF2B5EF4-FFF2-40B4-BE49-F238E27FC236}">
-                        <a16:creationId xmlns:a16="http://schemas.microsoft.com/office/drawing/2014/main" xmlns="" id="{1C8671F8-0EF6-48BF-BAA0-49DA87633070}"/>
-                      </a:ext>
-                    </a:extLst>
-                  </p:cNvPr>
-                  <p:cNvSpPr/>
-                  <p:nvPr/>
-                </p:nvSpPr>
-                <p:spPr>
-                  <a:xfrm rot="2700000">
-                    <a:off x="6407654" y="2173032"/>
-                    <a:ext cx="2648562" cy="2648562"/>
-                  </a:xfrm>
-                  <a:prstGeom prst="blockArc">
-                    <a:avLst>
-                      <a:gd name="adj1" fmla="val 6907547"/>
-                      <a:gd name="adj2" fmla="val 10321606"/>
-                      <a:gd name="adj3" fmla="val 12799"/>
-                    </a:avLst>
-                  </a:prstGeom>
-                  <a:solidFill>
-                    <a:srgbClr val="FACDB0"/>
-                  </a:solidFill>
-                  <a:ln>
-                    <a:noFill/>
-                  </a:ln>
-                </p:spPr>
-                <p:style>
-                  <a:lnRef idx="2">
-                    <a:schemeClr val="accent1">
-                      <a:shade val="50000"/>
-                    </a:schemeClr>
-                  </a:lnRef>
-                  <a:fillRef idx="1">
-                    <a:schemeClr val="accent1"/>
-                  </a:fillRef>
-                  <a:effectRef idx="0">
-                    <a:schemeClr val="accent1"/>
-                  </a:effectRef>
-                  <a:fontRef idx="minor">
-                    <a:schemeClr val="lt1"/>
-                  </a:fontRef>
-                </p:style>
-                <p:txBody>
-                  <a:bodyPr rtlCol="0" anchor="ctr"/>
-                  <a:lstStyle/>
-                  <a:p>
-                    <a:pPr algn="ctr"/>
-                    <a:endParaRPr lang="en-US">
-                      <a:solidFill>
-                        <a:schemeClr val="tx1"/>
-                      </a:solidFill>
-                    </a:endParaRPr>
-                  </a:p>
-                </p:txBody>
-              </p:sp>
-              <p:grpSp>
-                <p:nvGrpSpPr>
-                  <p:cNvPr id="114" name="Group 113">
-                    <a:extLst>
-                      <a:ext uri="{FF2B5EF4-FFF2-40B4-BE49-F238E27FC236}">
-                        <a16:creationId xmlns:a16="http://schemas.microsoft.com/office/drawing/2014/main" xmlns="" id="{545B7204-1D83-4C0D-BE83-62ABF3D49651}"/>
-                      </a:ext>
-                    </a:extLst>
-                  </p:cNvPr>
-                  <p:cNvGrpSpPr/>
-                  <p:nvPr/>
-                </p:nvGrpSpPr>
-                <p:grpSpPr>
-                  <a:xfrm>
-                    <a:off x="5330572" y="1501624"/>
-                    <a:ext cx="1351985" cy="539609"/>
-                    <a:chOff x="5420007" y="1501624"/>
-                    <a:chExt cx="1351985" cy="539609"/>
-                  </a:xfrm>
-                </p:grpSpPr>
-                <p:sp>
-                  <p:nvSpPr>
-                    <p:cNvPr id="136" name="Rectangle: Rounded Corners 31">
-                      <a:extLst>
-                        <a:ext uri="{FF2B5EF4-FFF2-40B4-BE49-F238E27FC236}">
-                          <a16:creationId xmlns:a16="http://schemas.microsoft.com/office/drawing/2014/main" xmlns="" id="{87427D9B-EF79-49FD-A1E5-69491C0B415F}"/>
-                        </a:ext>
-                      </a:extLst>
-                    </p:cNvPr>
-                    <p:cNvSpPr/>
-                    <p:nvPr/>
-                  </p:nvSpPr>
-                  <p:spPr>
-                    <a:xfrm>
-                      <a:off x="5471223" y="1501624"/>
-                      <a:ext cx="1211333" cy="434848"/>
-                    </a:xfrm>
-                    <a:prstGeom prst="roundRect">
-                      <a:avLst>
-                        <a:gd name="adj" fmla="val 23823"/>
-                      </a:avLst>
-                    </a:prstGeom>
-                    <a:solidFill>
-                      <a:schemeClr val="bg1"/>
-                    </a:solidFill>
-                    <a:ln>
-                      <a:noFill/>
-                    </a:ln>
-                  </p:spPr>
-                  <p:style>
-                    <a:lnRef idx="2">
-                      <a:schemeClr val="accent1">
-                        <a:shade val="50000"/>
-                      </a:schemeClr>
-                    </a:lnRef>
-                    <a:fillRef idx="1">
-                      <a:schemeClr val="accent1"/>
-                    </a:fillRef>
-                    <a:effectRef idx="0">
-                      <a:schemeClr val="accent1"/>
-                    </a:effectRef>
-                    <a:fontRef idx="minor">
-                      <a:schemeClr val="lt1"/>
-                    </a:fontRef>
-                  </p:style>
-                  <p:txBody>
-                    <a:bodyPr rtlCol="0" anchor="ctr"/>
-                    <a:lstStyle/>
-                    <a:p>
-                      <a:pPr algn="ctr"/>
-                      <a:endParaRPr lang="en-US"/>
-                    </a:p>
-                  </p:txBody>
-                </p:sp>
-                <p:sp>
-                  <p:nvSpPr>
-                    <p:cNvPr id="137" name="TextBox 136">
-                      <a:extLst>
-                        <a:ext uri="{FF2B5EF4-FFF2-40B4-BE49-F238E27FC236}">
-                          <a16:creationId xmlns:a16="http://schemas.microsoft.com/office/drawing/2014/main" xmlns="" id="{D23E27A5-2E47-4D2B-87A4-6222E7A91A57}"/>
-                        </a:ext>
-                      </a:extLst>
-                    </p:cNvPr>
-                    <p:cNvSpPr txBox="1"/>
-                    <p:nvPr/>
-                  </p:nvSpPr>
-                  <p:spPr>
-                    <a:xfrm>
-                      <a:off x="5420007" y="1549771"/>
-                      <a:ext cx="1351985" cy="491462"/>
-                    </a:xfrm>
-                    <a:prstGeom prst="rect">
-                      <a:avLst/>
-                    </a:prstGeom>
-                    <a:noFill/>
-                  </p:spPr>
-                  <p:txBody>
-                    <a:bodyPr wrap="square" rtlCol="0">
-                      <a:spAutoFit/>
-                    </a:bodyPr>
-                    <a:lstStyle/>
-                    <a:p>
-                      <a:pPr algn="ctr"/>
-                      <a:r>
-                        <a:rPr lang="en-US" sz="1600" dirty="0" smtClean="0">
-                          <a:solidFill>
-                            <a:srgbClr val="84AF9B"/>
-                          </a:solidFill>
-                          <a:latin typeface="DAGGERSQUARE" pitchFamily="50" charset="0"/>
-                        </a:rPr>
-                        <a:t> </a:t>
-                      </a:r>
-                      <a:endParaRPr lang="en-US" sz="1600" dirty="0">
-                        <a:solidFill>
-                          <a:srgbClr val="84AF9B"/>
-                        </a:solidFill>
-                        <a:latin typeface="DAGGERSQUARE" pitchFamily="50" charset="0"/>
-                      </a:endParaRPr>
-                    </a:p>
-                  </p:txBody>
-                </p:sp>
-              </p:grpSp>
-              <p:grpSp>
-                <p:nvGrpSpPr>
-                  <p:cNvPr id="115" name="Group 114">
-                    <a:extLst>
-                      <a:ext uri="{FF2B5EF4-FFF2-40B4-BE49-F238E27FC236}">
-                        <a16:creationId xmlns:a16="http://schemas.microsoft.com/office/drawing/2014/main" xmlns="" id="{8152BF32-AA3A-49D0-872C-2C2C8BF85EAC}"/>
-                      </a:ext>
-                    </a:extLst>
-                  </p:cNvPr>
-                  <p:cNvGrpSpPr/>
-                  <p:nvPr/>
-                </p:nvGrpSpPr>
-                <p:grpSpPr>
-                  <a:xfrm>
-                    <a:off x="8775369" y="1501624"/>
-                    <a:ext cx="1351985" cy="539609"/>
-                    <a:chOff x="5420007" y="1501624"/>
-                    <a:chExt cx="1351985" cy="539609"/>
-                  </a:xfrm>
-                </p:grpSpPr>
-                <p:sp>
-                  <p:nvSpPr>
-                    <p:cNvPr id="134" name="Rectangle: Rounded Corners 29">
-                      <a:extLst>
-                        <a:ext uri="{FF2B5EF4-FFF2-40B4-BE49-F238E27FC236}">
-                          <a16:creationId xmlns:a16="http://schemas.microsoft.com/office/drawing/2014/main" xmlns="" id="{4118C2D9-1696-473A-9AA7-A50F199C5710}"/>
-                        </a:ext>
-                      </a:extLst>
-                    </p:cNvPr>
-                    <p:cNvSpPr/>
-                    <p:nvPr/>
-                  </p:nvSpPr>
-                  <p:spPr>
-                    <a:xfrm>
-                      <a:off x="5471223" y="1501624"/>
-                      <a:ext cx="1211333" cy="434848"/>
-                    </a:xfrm>
-                    <a:prstGeom prst="roundRect">
-                      <a:avLst>
-                        <a:gd name="adj" fmla="val 23823"/>
-                      </a:avLst>
-                    </a:prstGeom>
-                    <a:solidFill>
-                      <a:schemeClr val="bg1"/>
-                    </a:solidFill>
-                    <a:ln>
-                      <a:noFill/>
-                    </a:ln>
-                  </p:spPr>
-                  <p:style>
-                    <a:lnRef idx="2">
-                      <a:schemeClr val="accent1">
-                        <a:shade val="50000"/>
-                      </a:schemeClr>
-                    </a:lnRef>
-                    <a:fillRef idx="1">
-                      <a:schemeClr val="accent1"/>
-                    </a:fillRef>
-                    <a:effectRef idx="0">
-                      <a:schemeClr val="accent1"/>
-                    </a:effectRef>
-                    <a:fontRef idx="minor">
-                      <a:schemeClr val="lt1"/>
-                    </a:fontRef>
-                  </p:style>
-                  <p:txBody>
-                    <a:bodyPr rtlCol="0" anchor="ctr"/>
-                    <a:lstStyle/>
-                    <a:p>
-                      <a:pPr algn="ctr"/>
-                      <a:endParaRPr lang="en-US"/>
-                    </a:p>
-                  </p:txBody>
-                </p:sp>
-                <p:sp>
-                  <p:nvSpPr>
-                    <p:cNvPr id="135" name="TextBox 134">
-                      <a:extLst>
-                        <a:ext uri="{FF2B5EF4-FFF2-40B4-BE49-F238E27FC236}">
-                          <a16:creationId xmlns:a16="http://schemas.microsoft.com/office/drawing/2014/main" xmlns="" id="{C945F886-6209-4FDB-B8B1-14B89C98C382}"/>
-                        </a:ext>
-                      </a:extLst>
-                    </p:cNvPr>
-                    <p:cNvSpPr txBox="1"/>
-                    <p:nvPr/>
-                  </p:nvSpPr>
-                  <p:spPr>
-                    <a:xfrm>
-                      <a:off x="5420007" y="1549771"/>
-                      <a:ext cx="1351985" cy="491462"/>
-                    </a:xfrm>
-                    <a:prstGeom prst="rect">
-                      <a:avLst/>
-                    </a:prstGeom>
-                    <a:noFill/>
-                  </p:spPr>
-                  <p:txBody>
-                    <a:bodyPr wrap="square" rtlCol="0">
-                      <a:spAutoFit/>
-                    </a:bodyPr>
-                    <a:lstStyle/>
-                    <a:p>
-                      <a:pPr algn="ctr"/>
-                      <a:endParaRPr lang="en-US" sz="1600" dirty="0">
-                        <a:solidFill>
-                          <a:srgbClr val="84AF9B"/>
-                        </a:solidFill>
-                        <a:latin typeface="DAGGERSQUARE" pitchFamily="50" charset="0"/>
-                      </a:endParaRPr>
-                    </a:p>
-                  </p:txBody>
-                </p:sp>
-              </p:grpSp>
-              <p:grpSp>
-                <p:nvGrpSpPr>
-                  <p:cNvPr id="116" name="Group 115">
-                    <a:extLst>
-                      <a:ext uri="{FF2B5EF4-FFF2-40B4-BE49-F238E27FC236}">
-                        <a16:creationId xmlns:a16="http://schemas.microsoft.com/office/drawing/2014/main" xmlns="" id="{4A691FB7-4AB0-4A48-B8FB-DF4B2422F1B5}"/>
-                      </a:ext>
-                    </a:extLst>
-                  </p:cNvPr>
-                  <p:cNvGrpSpPr/>
-                  <p:nvPr/>
-                </p:nvGrpSpPr>
-                <p:grpSpPr>
-                  <a:xfrm>
-                    <a:off x="5330572" y="5103373"/>
-                    <a:ext cx="1351985" cy="539609"/>
-                    <a:chOff x="5420007" y="1501624"/>
-                    <a:chExt cx="1351985" cy="539609"/>
-                  </a:xfrm>
-                </p:grpSpPr>
-                <p:sp>
-                  <p:nvSpPr>
-                    <p:cNvPr id="132" name="Rectangle: Rounded Corners 27">
-                      <a:extLst>
-                        <a:ext uri="{FF2B5EF4-FFF2-40B4-BE49-F238E27FC236}">
-                          <a16:creationId xmlns:a16="http://schemas.microsoft.com/office/drawing/2014/main" xmlns="" id="{90746E6F-8DB7-44AF-807D-D7D589576DA0}"/>
-                        </a:ext>
-                      </a:extLst>
-                    </p:cNvPr>
-                    <p:cNvSpPr/>
-                    <p:nvPr/>
-                  </p:nvSpPr>
-                  <p:spPr>
-                    <a:xfrm>
-                      <a:off x="5471223" y="1501624"/>
-                      <a:ext cx="1211333" cy="434848"/>
-                    </a:xfrm>
-                    <a:prstGeom prst="roundRect">
-                      <a:avLst>
-                        <a:gd name="adj" fmla="val 23823"/>
-                      </a:avLst>
-                    </a:prstGeom>
-                    <a:solidFill>
-                      <a:schemeClr val="bg1"/>
-                    </a:solidFill>
-                    <a:ln>
-                      <a:noFill/>
-                    </a:ln>
-                  </p:spPr>
-                  <p:style>
-                    <a:lnRef idx="2">
-                      <a:schemeClr val="accent1">
-                        <a:shade val="50000"/>
-                      </a:schemeClr>
-                    </a:lnRef>
-                    <a:fillRef idx="1">
-                      <a:schemeClr val="accent1"/>
-                    </a:fillRef>
-                    <a:effectRef idx="0">
-                      <a:schemeClr val="accent1"/>
-                    </a:effectRef>
-                    <a:fontRef idx="minor">
-                      <a:schemeClr val="lt1"/>
-                    </a:fontRef>
-                  </p:style>
-                  <p:txBody>
-                    <a:bodyPr rtlCol="0" anchor="ctr"/>
-                    <a:lstStyle/>
-                    <a:p>
-                      <a:pPr algn="ctr"/>
-                      <a:endParaRPr lang="en-US"/>
-                    </a:p>
-                  </p:txBody>
-                </p:sp>
-                <p:sp>
-                  <p:nvSpPr>
-                    <p:cNvPr id="133" name="TextBox 132">
-                      <a:extLst>
-                        <a:ext uri="{FF2B5EF4-FFF2-40B4-BE49-F238E27FC236}">
-                          <a16:creationId xmlns:a16="http://schemas.microsoft.com/office/drawing/2014/main" xmlns="" id="{06A29855-C4C0-4870-BB9D-E3C859C8F72E}"/>
-                        </a:ext>
-                      </a:extLst>
-                    </p:cNvPr>
-                    <p:cNvSpPr txBox="1"/>
-                    <p:nvPr/>
-                  </p:nvSpPr>
-                  <p:spPr>
-                    <a:xfrm>
-                      <a:off x="5420007" y="1549771"/>
-                      <a:ext cx="1351985" cy="491462"/>
-                    </a:xfrm>
-                    <a:prstGeom prst="rect">
-                      <a:avLst/>
-                    </a:prstGeom>
-                    <a:noFill/>
-                  </p:spPr>
-                  <p:txBody>
-                    <a:bodyPr wrap="square" rtlCol="0">
-                      <a:spAutoFit/>
-                    </a:bodyPr>
-                    <a:lstStyle/>
-                    <a:p>
-                      <a:pPr algn="ctr"/>
-                      <a:endParaRPr lang="en-US" sz="1600" dirty="0">
-                        <a:solidFill>
-                          <a:srgbClr val="84AF9B"/>
-                        </a:solidFill>
-                        <a:latin typeface="DAGGERSQUARE" pitchFamily="50" charset="0"/>
-                      </a:endParaRPr>
-                    </a:p>
-                  </p:txBody>
-                </p:sp>
-              </p:grpSp>
-              <p:grpSp>
-                <p:nvGrpSpPr>
-                  <p:cNvPr id="117" name="Group 116">
-                    <a:extLst>
-                      <a:ext uri="{FF2B5EF4-FFF2-40B4-BE49-F238E27FC236}">
-                        <a16:creationId xmlns:a16="http://schemas.microsoft.com/office/drawing/2014/main" xmlns="" id="{C6FAA41B-65FD-4E4A-BA46-DF4254052815}"/>
-                      </a:ext>
-                    </a:extLst>
-                  </p:cNvPr>
-                  <p:cNvGrpSpPr/>
-                  <p:nvPr/>
-                </p:nvGrpSpPr>
-                <p:grpSpPr>
-                  <a:xfrm>
-                    <a:off x="8775369" y="5103373"/>
-                    <a:ext cx="1351985" cy="539609"/>
-                    <a:chOff x="5420007" y="1501624"/>
-                    <a:chExt cx="1351985" cy="539609"/>
-                  </a:xfrm>
-                </p:grpSpPr>
-                <p:sp>
-                  <p:nvSpPr>
-                    <p:cNvPr id="130" name="Rectangle: Rounded Corners 25">
-                      <a:extLst>
-                        <a:ext uri="{FF2B5EF4-FFF2-40B4-BE49-F238E27FC236}">
-                          <a16:creationId xmlns:a16="http://schemas.microsoft.com/office/drawing/2014/main" xmlns="" id="{EFE45DF1-6760-4326-A92D-7D1FD65C31B4}"/>
-                        </a:ext>
-                      </a:extLst>
-                    </p:cNvPr>
-                    <p:cNvSpPr/>
-                    <p:nvPr/>
-                  </p:nvSpPr>
-                  <p:spPr>
-                    <a:xfrm>
-                      <a:off x="5471223" y="1501624"/>
-                      <a:ext cx="1211333" cy="434848"/>
-                    </a:xfrm>
-                    <a:prstGeom prst="roundRect">
-                      <a:avLst>
-                        <a:gd name="adj" fmla="val 23823"/>
-                      </a:avLst>
-                    </a:prstGeom>
-                    <a:solidFill>
-                      <a:schemeClr val="bg1"/>
-                    </a:solidFill>
-                    <a:ln>
-                      <a:noFill/>
-                    </a:ln>
-                  </p:spPr>
-                  <p:style>
-                    <a:lnRef idx="2">
-                      <a:schemeClr val="accent1">
-                        <a:shade val="50000"/>
-                      </a:schemeClr>
-                    </a:lnRef>
-                    <a:fillRef idx="1">
-                      <a:schemeClr val="accent1"/>
-                    </a:fillRef>
-                    <a:effectRef idx="0">
-                      <a:schemeClr val="accent1"/>
-                    </a:effectRef>
-                    <a:fontRef idx="minor">
-                      <a:schemeClr val="lt1"/>
-                    </a:fontRef>
-                  </p:style>
-                  <p:txBody>
-                    <a:bodyPr rtlCol="0" anchor="ctr"/>
-                    <a:lstStyle/>
-                    <a:p>
-                      <a:pPr algn="ctr"/>
-                      <a:endParaRPr lang="en-US"/>
-                    </a:p>
-                  </p:txBody>
-                </p:sp>
-                <p:sp>
-                  <p:nvSpPr>
-                    <p:cNvPr id="131" name="TextBox 130">
-                      <a:extLst>
-                        <a:ext uri="{FF2B5EF4-FFF2-40B4-BE49-F238E27FC236}">
-                          <a16:creationId xmlns:a16="http://schemas.microsoft.com/office/drawing/2014/main" xmlns="" id="{A936C834-1CC0-4A8F-8EAA-4CDD26A5F25A}"/>
-                        </a:ext>
-                      </a:extLst>
-                    </p:cNvPr>
-                    <p:cNvSpPr txBox="1"/>
-                    <p:nvPr/>
-                  </p:nvSpPr>
-                  <p:spPr>
-                    <a:xfrm>
-                      <a:off x="5420007" y="1549771"/>
-                      <a:ext cx="1351985" cy="491462"/>
-                    </a:xfrm>
-                    <a:prstGeom prst="rect">
-                      <a:avLst/>
-                    </a:prstGeom>
-                    <a:noFill/>
-                  </p:spPr>
-                  <p:txBody>
-                    <a:bodyPr wrap="square" rtlCol="0">
-                      <a:spAutoFit/>
-                    </a:bodyPr>
-                    <a:lstStyle/>
-                    <a:p>
-                      <a:pPr algn="ctr"/>
-                      <a:endParaRPr lang="en-US" sz="1600" dirty="0">
-                        <a:solidFill>
-                          <a:srgbClr val="84AF9B"/>
-                        </a:solidFill>
-                        <a:latin typeface="DAGGERSQUARE" pitchFamily="50" charset="0"/>
-                      </a:endParaRPr>
-                    </a:p>
-                  </p:txBody>
-                </p:sp>
-              </p:grpSp>
-              <p:grpSp>
-                <p:nvGrpSpPr>
-                  <p:cNvPr id="118" name="Group 117">
-                    <a:extLst>
-                      <a:ext uri="{FF2B5EF4-FFF2-40B4-BE49-F238E27FC236}">
-                        <a16:creationId xmlns:a16="http://schemas.microsoft.com/office/drawing/2014/main" xmlns="" id="{7CEDFA43-ACD9-429B-A74A-078F50F2DEC9}"/>
-                      </a:ext>
-                    </a:extLst>
-                  </p:cNvPr>
-                  <p:cNvGrpSpPr/>
-                  <p:nvPr/>
-                </p:nvGrpSpPr>
-                <p:grpSpPr>
-                  <a:xfrm>
-                    <a:off x="7343775" y="1719048"/>
-                    <a:ext cx="1482810" cy="551336"/>
-                    <a:chOff x="7343775" y="1719048"/>
-                    <a:chExt cx="1482810" cy="551336"/>
-                  </a:xfrm>
-                </p:grpSpPr>
-                <p:cxnSp>
-                  <p:nvCxnSpPr>
-                    <p:cNvPr id="128" name="Straight Connector 127">
-                      <a:extLst>
-                        <a:ext uri="{FF2B5EF4-FFF2-40B4-BE49-F238E27FC236}">
-                          <a16:creationId xmlns:a16="http://schemas.microsoft.com/office/drawing/2014/main" xmlns="" id="{4DDAE2B7-35E6-4732-B41F-F8575DC2CED7}"/>
-                        </a:ext>
-                      </a:extLst>
-                    </p:cNvPr>
-                    <p:cNvCxnSpPr/>
-                    <p:nvPr/>
-                  </p:nvCxnSpPr>
-                  <p:spPr>
-                    <a:xfrm flipV="1">
-                      <a:off x="7346950" y="1719048"/>
-                      <a:ext cx="0" cy="551336"/>
-                    </a:xfrm>
-                    <a:prstGeom prst="line">
-                      <a:avLst/>
-                    </a:prstGeom>
-                    <a:ln>
-                      <a:solidFill>
-                        <a:srgbClr val="84AF9B"/>
-                      </a:solidFill>
-                    </a:ln>
-                  </p:spPr>
-                  <p:style>
-                    <a:lnRef idx="1">
-                      <a:schemeClr val="accent1"/>
-                    </a:lnRef>
-                    <a:fillRef idx="0">
-                      <a:schemeClr val="accent1"/>
-                    </a:fillRef>
-                    <a:effectRef idx="0">
-                      <a:schemeClr val="accent1"/>
-                    </a:effectRef>
-                    <a:fontRef idx="minor">
-                      <a:schemeClr val="tx1"/>
-                    </a:fontRef>
-                  </p:style>
-                </p:cxnSp>
-                <p:cxnSp>
-                  <p:nvCxnSpPr>
-                    <p:cNvPr id="129" name="Straight Arrow Connector 128">
-                      <a:extLst>
-                        <a:ext uri="{FF2B5EF4-FFF2-40B4-BE49-F238E27FC236}">
-                          <a16:creationId xmlns:a16="http://schemas.microsoft.com/office/drawing/2014/main" xmlns="" id="{67EA415D-FD28-48C4-859F-8A8EC72208AC}"/>
-                        </a:ext>
-                      </a:extLst>
-                    </p:cNvPr>
-                    <p:cNvCxnSpPr/>
-                    <p:nvPr/>
-                  </p:nvCxnSpPr>
-                  <p:spPr>
-                    <a:xfrm>
-                      <a:off x="7343775" y="1719048"/>
-                      <a:ext cx="1482810" cy="0"/>
-                    </a:xfrm>
-                    <a:prstGeom prst="straightConnector1">
-                      <a:avLst/>
-                    </a:prstGeom>
-                    <a:ln>
-                      <a:solidFill>
-                        <a:srgbClr val="84AF9B"/>
-                      </a:solidFill>
-                      <a:tailEnd type="triangle"/>
-                    </a:ln>
-                  </p:spPr>
-                  <p:style>
-                    <a:lnRef idx="1">
-                      <a:schemeClr val="accent1"/>
-                    </a:lnRef>
-                    <a:fillRef idx="0">
-                      <a:schemeClr val="accent1"/>
-                    </a:fillRef>
-                    <a:effectRef idx="0">
-                      <a:schemeClr val="accent1"/>
-                    </a:effectRef>
-                    <a:fontRef idx="minor">
-                      <a:schemeClr val="tx1"/>
-                    </a:fontRef>
-                  </p:style>
-                </p:cxnSp>
-              </p:grpSp>
-              <p:grpSp>
-                <p:nvGrpSpPr>
-                  <p:cNvPr id="119" name="Group 118">
-                    <a:extLst>
-                      <a:ext uri="{FF2B5EF4-FFF2-40B4-BE49-F238E27FC236}">
-                        <a16:creationId xmlns:a16="http://schemas.microsoft.com/office/drawing/2014/main" xmlns="" id="{2A025B40-76E0-4515-93B7-441AF6A6833C}"/>
-                      </a:ext>
-                    </a:extLst>
-                  </p:cNvPr>
-                  <p:cNvGrpSpPr/>
-                  <p:nvPr/>
-                </p:nvGrpSpPr>
-                <p:grpSpPr>
-                  <a:xfrm>
-                    <a:off x="6006564" y="1936472"/>
-                    <a:ext cx="407654" cy="1424215"/>
-                    <a:chOff x="6006564" y="1936472"/>
-                    <a:chExt cx="407654" cy="1424215"/>
-                  </a:xfrm>
-                </p:grpSpPr>
-                <p:cxnSp>
-                  <p:nvCxnSpPr>
-                    <p:cNvPr id="126" name="Straight Connector 125">
-                      <a:extLst>
-                        <a:ext uri="{FF2B5EF4-FFF2-40B4-BE49-F238E27FC236}">
-                          <a16:creationId xmlns:a16="http://schemas.microsoft.com/office/drawing/2014/main" xmlns="" id="{03BDB849-A6F1-4243-A952-FAE59F171043}"/>
-                        </a:ext>
-                      </a:extLst>
-                    </p:cNvPr>
-                    <p:cNvCxnSpPr/>
-                    <p:nvPr/>
-                  </p:nvCxnSpPr>
-                  <p:spPr>
-                    <a:xfrm flipH="1">
-                      <a:off x="6006564" y="3360687"/>
-                      <a:ext cx="407654" cy="0"/>
-                    </a:xfrm>
-                    <a:prstGeom prst="line">
-                      <a:avLst/>
-                    </a:prstGeom>
-                    <a:ln>
-                      <a:solidFill>
-                        <a:srgbClr val="FACDB0"/>
-                      </a:solidFill>
-                    </a:ln>
-                  </p:spPr>
-                  <p:style>
-                    <a:lnRef idx="1">
-                      <a:schemeClr val="accent1"/>
-                    </a:lnRef>
-                    <a:fillRef idx="0">
-                      <a:schemeClr val="accent1"/>
-                    </a:fillRef>
-                    <a:effectRef idx="0">
-                      <a:schemeClr val="accent1"/>
-                    </a:effectRef>
-                    <a:fontRef idx="minor">
-                      <a:schemeClr val="tx1"/>
-                    </a:fontRef>
-                  </p:style>
-                </p:cxnSp>
-                <p:cxnSp>
-                  <p:nvCxnSpPr>
-                    <p:cNvPr id="127" name="Straight Arrow Connector 126">
-                      <a:extLst>
-                        <a:ext uri="{FF2B5EF4-FFF2-40B4-BE49-F238E27FC236}">
-                          <a16:creationId xmlns:a16="http://schemas.microsoft.com/office/drawing/2014/main" xmlns="" id="{05115A95-A8ED-42FB-BF9B-17F8CFE37F71}"/>
-                        </a:ext>
-                      </a:extLst>
-                    </p:cNvPr>
-                    <p:cNvCxnSpPr>
-                      <a:cxnSpLocks/>
-                    </p:cNvCxnSpPr>
-                    <p:nvPr/>
-                  </p:nvCxnSpPr>
-                  <p:spPr>
-                    <a:xfrm flipV="1">
-                      <a:off x="6006564" y="1936472"/>
-                      <a:ext cx="0" cy="1424215"/>
-                    </a:xfrm>
-                    <a:prstGeom prst="straightConnector1">
-                      <a:avLst/>
-                    </a:prstGeom>
-                    <a:ln>
-                      <a:solidFill>
-                        <a:srgbClr val="FACDB0"/>
-                      </a:solidFill>
-                      <a:tailEnd type="triangle"/>
-                    </a:ln>
-                  </p:spPr>
-                  <p:style>
-                    <a:lnRef idx="1">
-                      <a:schemeClr val="accent1"/>
-                    </a:lnRef>
-                    <a:fillRef idx="0">
-                      <a:schemeClr val="accent1"/>
-                    </a:fillRef>
-                    <a:effectRef idx="0">
-                      <a:schemeClr val="accent1"/>
-                    </a:effectRef>
-                    <a:fontRef idx="minor">
-                      <a:schemeClr val="tx1"/>
-                    </a:fontRef>
-                  </p:style>
-                </p:cxnSp>
-              </p:grpSp>
-              <p:grpSp>
-                <p:nvGrpSpPr>
-                  <p:cNvPr id="120" name="Group 119">
-                    <a:extLst>
-                      <a:ext uri="{FF2B5EF4-FFF2-40B4-BE49-F238E27FC236}">
-                        <a16:creationId xmlns:a16="http://schemas.microsoft.com/office/drawing/2014/main" xmlns="" id="{EF3330C0-1D7E-47B1-B06A-FCC443615695}"/>
-                      </a:ext>
-                    </a:extLst>
-                  </p:cNvPr>
-                  <p:cNvGrpSpPr/>
-                  <p:nvPr/>
-                </p:nvGrpSpPr>
-                <p:grpSpPr>
-                  <a:xfrm>
-                    <a:off x="5987454" y="4498459"/>
-                    <a:ext cx="892158" cy="604914"/>
-                    <a:chOff x="5987454" y="4498459"/>
-                    <a:chExt cx="892158" cy="604914"/>
-                  </a:xfrm>
-                </p:grpSpPr>
-                <p:cxnSp>
-                  <p:nvCxnSpPr>
-                    <p:cNvPr id="124" name="Straight Connector 123">
-                      <a:extLst>
-                        <a:ext uri="{FF2B5EF4-FFF2-40B4-BE49-F238E27FC236}">
-                          <a16:creationId xmlns:a16="http://schemas.microsoft.com/office/drawing/2014/main" xmlns="" id="{8DB758F0-BB49-49F9-B2CF-293C04A2A45F}"/>
-                        </a:ext>
-                      </a:extLst>
-                    </p:cNvPr>
-                    <p:cNvCxnSpPr>
-                      <a:cxnSpLocks/>
-                    </p:cNvCxnSpPr>
-                    <p:nvPr/>
-                  </p:nvCxnSpPr>
-                  <p:spPr>
-                    <a:xfrm flipH="1">
-                      <a:off x="5987454" y="4498459"/>
-                      <a:ext cx="892158" cy="0"/>
-                    </a:xfrm>
-                    <a:prstGeom prst="line">
-                      <a:avLst/>
-                    </a:prstGeom>
-                    <a:ln>
-                      <a:solidFill>
-                        <a:srgbClr val="FC9D99"/>
-                      </a:solidFill>
-                    </a:ln>
-                  </p:spPr>
-                  <p:style>
-                    <a:lnRef idx="1">
-                      <a:schemeClr val="accent1"/>
-                    </a:lnRef>
-                    <a:fillRef idx="0">
-                      <a:schemeClr val="accent1"/>
-                    </a:fillRef>
-                    <a:effectRef idx="0">
-                      <a:schemeClr val="accent1"/>
-                    </a:effectRef>
-                    <a:fontRef idx="minor">
-                      <a:schemeClr val="tx1"/>
-                    </a:fontRef>
-                  </p:style>
-                </p:cxnSp>
-                <p:cxnSp>
-                  <p:nvCxnSpPr>
-                    <p:cNvPr id="125" name="Straight Arrow Connector 124">
-                      <a:extLst>
-                        <a:ext uri="{FF2B5EF4-FFF2-40B4-BE49-F238E27FC236}">
-                          <a16:creationId xmlns:a16="http://schemas.microsoft.com/office/drawing/2014/main" xmlns="" id="{F915A466-1BC6-40AD-B866-E21EA8EC4712}"/>
-                        </a:ext>
-                      </a:extLst>
-                    </p:cNvPr>
-                    <p:cNvCxnSpPr/>
-                    <p:nvPr/>
-                  </p:nvCxnSpPr>
-                  <p:spPr>
-                    <a:xfrm>
-                      <a:off x="5988843" y="4498459"/>
-                      <a:ext cx="0" cy="604914"/>
-                    </a:xfrm>
-                    <a:prstGeom prst="straightConnector1">
-                      <a:avLst/>
-                    </a:prstGeom>
-                    <a:ln>
-                      <a:solidFill>
-                        <a:srgbClr val="FC9D99"/>
-                      </a:solidFill>
-                      <a:tailEnd type="triangle"/>
-                    </a:ln>
-                  </p:spPr>
-                  <p:style>
-                    <a:lnRef idx="1">
-                      <a:schemeClr val="accent1"/>
-                    </a:lnRef>
-                    <a:fillRef idx="0">
-                      <a:schemeClr val="accent1"/>
-                    </a:fillRef>
-                    <a:effectRef idx="0">
-                      <a:schemeClr val="accent1"/>
-                    </a:effectRef>
-                    <a:fontRef idx="minor">
-                      <a:schemeClr val="tx1"/>
-                    </a:fontRef>
-                  </p:style>
-                </p:cxnSp>
-              </p:grpSp>
-              <p:grpSp>
-                <p:nvGrpSpPr>
-                  <p:cNvPr id="121" name="Group 120">
-                    <a:extLst>
-                      <a:ext uri="{FF2B5EF4-FFF2-40B4-BE49-F238E27FC236}">
-                        <a16:creationId xmlns:a16="http://schemas.microsoft.com/office/drawing/2014/main" xmlns="" id="{CD926A5C-4E1C-4EB0-8C57-DBC895CD0815}"/>
-                      </a:ext>
-                    </a:extLst>
-                  </p:cNvPr>
-                  <p:cNvGrpSpPr/>
-                  <p:nvPr/>
-                </p:nvGrpSpPr>
-                <p:grpSpPr>
-                  <a:xfrm>
-                    <a:off x="9051453" y="3517465"/>
-                    <a:ext cx="380799" cy="1585908"/>
-                    <a:chOff x="9051453" y="3517465"/>
-                    <a:chExt cx="380799" cy="1585908"/>
-                  </a:xfrm>
-                </p:grpSpPr>
-                <p:cxnSp>
-                  <p:nvCxnSpPr>
-                    <p:cNvPr id="122" name="Straight Connector 121">
-                      <a:extLst>
-                        <a:ext uri="{FF2B5EF4-FFF2-40B4-BE49-F238E27FC236}">
-                          <a16:creationId xmlns:a16="http://schemas.microsoft.com/office/drawing/2014/main" xmlns="" id="{8E41D740-1156-42EE-BC6C-DF7BFD5EF0E9}"/>
-                        </a:ext>
-                      </a:extLst>
-                    </p:cNvPr>
-                    <p:cNvCxnSpPr>
-                      <a:cxnSpLocks/>
-                    </p:cNvCxnSpPr>
-                    <p:nvPr/>
-                  </p:nvCxnSpPr>
-                  <p:spPr>
-                    <a:xfrm>
-                      <a:off x="9051453" y="3517465"/>
-                      <a:ext cx="380798" cy="0"/>
-                    </a:xfrm>
-                    <a:prstGeom prst="line">
-                      <a:avLst/>
-                    </a:prstGeom>
-                    <a:ln>
-                      <a:solidFill>
-                        <a:srgbClr val="FC4A7E"/>
-                      </a:solidFill>
-                    </a:ln>
-                  </p:spPr>
-                  <p:style>
-                    <a:lnRef idx="1">
-                      <a:schemeClr val="accent1"/>
-                    </a:lnRef>
-                    <a:fillRef idx="0">
-                      <a:schemeClr val="accent1"/>
-                    </a:fillRef>
-                    <a:effectRef idx="0">
-                      <a:schemeClr val="accent1"/>
-                    </a:effectRef>
-                    <a:fontRef idx="minor">
-                      <a:schemeClr val="tx1"/>
-                    </a:fontRef>
-                  </p:style>
-                </p:cxnSp>
-                <p:cxnSp>
-                  <p:nvCxnSpPr>
-                    <p:cNvPr id="123" name="Straight Arrow Connector 122">
-                      <a:extLst>
-                        <a:ext uri="{FF2B5EF4-FFF2-40B4-BE49-F238E27FC236}">
-                          <a16:creationId xmlns:a16="http://schemas.microsoft.com/office/drawing/2014/main" xmlns="" id="{4DF03CCD-2EA1-4C85-8D26-8DAD2BCEE402}"/>
-                        </a:ext>
-                      </a:extLst>
-                    </p:cNvPr>
-                    <p:cNvCxnSpPr/>
-                    <p:nvPr/>
-                  </p:nvCxnSpPr>
-                  <p:spPr>
-                    <a:xfrm>
-                      <a:off x="9432251" y="3518100"/>
-                      <a:ext cx="1" cy="1585273"/>
-                    </a:xfrm>
-                    <a:prstGeom prst="straightConnector1">
-                      <a:avLst/>
-                    </a:prstGeom>
-                    <a:ln>
-                      <a:solidFill>
-                        <a:srgbClr val="FC4A7E"/>
-                      </a:solidFill>
-                      <a:tailEnd type="triangle"/>
-                    </a:ln>
-                  </p:spPr>
-                  <p:style>
-                    <a:lnRef idx="1">
-                      <a:schemeClr val="accent1"/>
-                    </a:lnRef>
-                    <a:fillRef idx="0">
-                      <a:schemeClr val="accent1"/>
-                    </a:fillRef>
-                    <a:effectRef idx="0">
-                      <a:schemeClr val="accent1"/>
-                    </a:effectRef>
-                    <a:fontRef idx="minor">
-                      <a:schemeClr val="tx1"/>
-                    </a:fontRef>
-                  </p:style>
-                </p:cxnSp>
-              </p:grpSp>
-            </p:grpSp>
-          </p:grpSp>
-        </p:grpSp>
-      </p:grpSp>
-      <p:grpSp>
-        <p:nvGrpSpPr>
           <p:cNvPr id="142" name="Group 141"/>
           <p:cNvGrpSpPr/>
           <p:nvPr/>
         </p:nvGrpSpPr>
         <p:grpSpPr>
           <a:xfrm>
-            <a:off x="-9352674" y="0"/>
+            <a:off x="-7787293" y="0"/>
             <a:ext cx="11364686" cy="6858000"/>
             <a:chOff x="-3365531" y="0"/>
             <a:chExt cx="11364686" cy="6858000"/>
           </a:xfrm>
+          <a:solidFill>
+            <a:srgbClr val="F39C98"/>
+          </a:solidFill>
         </p:grpSpPr>
         <p:grpSp>
           <p:nvGrpSpPr>
@@ -5491,6 +4863,7 @@
               <a:chOff x="-4038601" y="0"/>
               <a:chExt cx="11364686" cy="6858000"/>
             </a:xfrm>
+            <a:grpFill/>
             <a:effectLst>
               <a:outerShdw blurRad="254000" dist="88900" algn="l" rotWithShape="0">
                 <a:prstClr val="black">
@@ -5513,9 +4886,7 @@
               <a:prstGeom prst="rect">
                 <a:avLst/>
               </a:prstGeom>
-              <a:solidFill>
-                <a:srgbClr val="F85E84"/>
-              </a:solidFill>
+              <a:grpFill/>
               <a:ln>
                 <a:noFill/>
               </a:ln>
@@ -5553,14 +4924,12 @@
             </p:nvGrpSpPr>
             <p:grpSpPr>
               <a:xfrm>
-                <a:off x="6857999" y="2378520"/>
+                <a:off x="6857999" y="2588720"/>
                 <a:ext cx="468086" cy="555171"/>
-                <a:chOff x="10896600" y="3151414"/>
+                <a:chOff x="10896600" y="3361614"/>
                 <a:chExt cx="468086" cy="555171"/>
               </a:xfrm>
-              <a:solidFill>
-                <a:srgbClr val="F85E84"/>
-              </a:solidFill>
+              <a:grpFill/>
             </p:grpSpPr>
             <p:sp>
               <p:nvSpPr>
@@ -5570,7 +4939,7 @@
               </p:nvSpPr>
               <p:spPr>
                 <a:xfrm rot="5400000">
-                  <a:off x="10853057" y="3194957"/>
+                  <a:off x="10853057" y="3405157"/>
                   <a:ext cx="555171" cy="468086"/>
                 </a:xfrm>
                 <a:prstGeom prst="round2SameRect">
@@ -5614,7 +4983,7 @@
               </p:nvSpPr>
               <p:spPr>
                 <a:xfrm>
-                  <a:off x="10972799" y="3151414"/>
+                  <a:off x="10972799" y="3393145"/>
                   <a:ext cx="315687" cy="492443"/>
                 </a:xfrm>
                 <a:prstGeom prst="rect">
@@ -5631,22 +5000,14 @@
                   <a:r>
                     <a:rPr lang="en-US" sz="2600" b="1" dirty="0">
                       <a:solidFill>
-                        <a:srgbClr val="F39C98"/>
+                        <a:srgbClr val="F4B183"/>
                       </a:solidFill>
                       <a:latin typeface="Calibri" charset="0"/>
                       <a:ea typeface="Calibri" charset="0"/>
                       <a:cs typeface="Calibri" charset="0"/>
                     </a:rPr>
-                    <a:t>5</a:t>
+                    <a:t>4</a:t>
                   </a:r>
-                  <a:endParaRPr lang="en-US" sz="2600" b="1" dirty="0">
-                    <a:solidFill>
-                      <a:srgbClr val="F39C98"/>
-                    </a:solidFill>
-                    <a:latin typeface="Calibri" charset="0"/>
-                    <a:ea typeface="Calibri" charset="0"/>
-                    <a:cs typeface="Calibri" charset="0"/>
-                  </a:endParaRPr>
                 </a:p>
               </p:txBody>
             </p:sp>
@@ -5660,13 +5021,13 @@
           </p:nvSpPr>
           <p:spPr>
             <a:xfrm>
-              <a:off x="1909845" y="1600200"/>
-              <a:ext cx="4321884" cy="584775"/>
+              <a:off x="2298205" y="783166"/>
+              <a:ext cx="4321884" cy="5109091"/>
             </a:xfrm>
             <a:prstGeom prst="rect">
               <a:avLst/>
             </a:prstGeom>
-            <a:noFill/>
+            <a:grpFill/>
           </p:spPr>
           <p:txBody>
             <a:bodyPr wrap="square" rtlCol="0">
@@ -5674,9 +5035,8 @@
             </a:bodyPr>
             <a:lstStyle/>
             <a:p>
-              <a:pPr algn="ctr"/>
               <a:r>
-                <a:rPr lang="en-US" sz="3200" dirty="0" smtClean="0">
+                <a:rPr lang="en-US" sz="2000" b="1" dirty="0" smtClean="0">
                   <a:solidFill>
                     <a:srgbClr val="C00000"/>
                   </a:solidFill>
@@ -5684,9 +5044,209 @@
                   <a:ea typeface="Tw Cen MT" charset="0"/>
                   <a:cs typeface="Tw Cen MT" charset="0"/>
                 </a:rPr>
-                <a:t>Some stuff</a:t>
+                <a:t>What do we need to know in order to use metasploit?</a:t>
               </a:r>
-              <a:endParaRPr lang="en-US" sz="3200" dirty="0">
+            </a:p>
+            <a:p>
+              <a:pPr>
+                <a:lnSpc>
+                  <a:spcPct val="150000"/>
+                </a:lnSpc>
+              </a:pPr>
+              <a:r>
+                <a:rPr lang="en-US" sz="2000" dirty="0" smtClean="0">
+                  <a:solidFill>
+                    <a:srgbClr val="C00000"/>
+                  </a:solidFill>
+                  <a:latin typeface="Tw Cen MT" charset="0"/>
+                  <a:ea typeface="Tw Cen MT" charset="0"/>
+                  <a:cs typeface="Tw Cen MT" charset="0"/>
+                </a:rPr>
+                <a:t>Modules</a:t>
+              </a:r>
+            </a:p>
+            <a:p>
+              <a:pPr marL="285750" indent="-285750">
+                <a:buFont typeface="Arial" charset="0"/>
+                <a:buChar char="•"/>
+              </a:pPr>
+              <a:r>
+                <a:rPr lang="en-US" sz="1600" b="1" dirty="0" smtClean="0">
+                  <a:solidFill>
+                    <a:srgbClr val="C00000"/>
+                  </a:solidFill>
+                  <a:latin typeface="Tw Cen MT" charset="0"/>
+                  <a:ea typeface="Tw Cen MT" charset="0"/>
+                  <a:cs typeface="Tw Cen MT" charset="0"/>
+                </a:rPr>
+                <a:t>Exploit </a:t>
+              </a:r>
+              <a:r>
+                <a:rPr lang="en-US" sz="1600" dirty="0" smtClean="0">
+                  <a:solidFill>
+                    <a:srgbClr val="C00000"/>
+                  </a:solidFill>
+                  <a:latin typeface="Tw Cen MT" charset="0"/>
+                  <a:ea typeface="Tw Cen MT" charset="0"/>
+                  <a:cs typeface="Tw Cen MT" charset="0"/>
+                </a:rPr>
+                <a:t>: An attack on a system to take advantage of a vulnerability</a:t>
+              </a:r>
+            </a:p>
+            <a:p>
+              <a:pPr marL="285750" indent="-285750">
+                <a:buFont typeface="Arial" charset="0"/>
+                <a:buChar char="•"/>
+              </a:pPr>
+              <a:r>
+                <a:rPr lang="en-US" sz="1600" b="1" dirty="0" smtClean="0">
+                  <a:solidFill>
+                    <a:srgbClr val="C00000"/>
+                  </a:solidFill>
+                  <a:latin typeface="Tw Cen MT" charset="0"/>
+                  <a:ea typeface="Tw Cen MT" charset="0"/>
+                  <a:cs typeface="Tw Cen MT" charset="0"/>
+                </a:rPr>
+                <a:t>Payload : </a:t>
+              </a:r>
+              <a:r>
+                <a:rPr lang="en-US" sz="1600" dirty="0" smtClean="0">
+                  <a:solidFill>
+                    <a:srgbClr val="C00000"/>
+                  </a:solidFill>
+                  <a:latin typeface="Tw Cen MT" charset="0"/>
+                  <a:ea typeface="Tw Cen MT" charset="0"/>
+                  <a:cs typeface="Tw Cen MT" charset="0"/>
+                </a:rPr>
+                <a:t>A piece of code that runs on a vulnerable system after exploitation</a:t>
+              </a:r>
+            </a:p>
+            <a:p>
+              <a:pPr marL="285750" indent="-285750">
+                <a:buFont typeface="Arial" charset="0"/>
+                <a:buChar char="•"/>
+              </a:pPr>
+              <a:r>
+                <a:rPr lang="en-US" sz="1600" b="1" dirty="0" smtClean="0">
+                  <a:solidFill>
+                    <a:srgbClr val="C00000"/>
+                  </a:solidFill>
+                  <a:latin typeface="Tw Cen MT" charset="0"/>
+                  <a:ea typeface="Tw Cen MT" charset="0"/>
+                  <a:cs typeface="Tw Cen MT" charset="0"/>
+                </a:rPr>
+                <a:t>Auxiliary : </a:t>
+              </a:r>
+              <a:r>
+                <a:rPr lang="en-US" sz="1600" dirty="0" smtClean="0">
+                  <a:solidFill>
+                    <a:srgbClr val="C00000"/>
+                  </a:solidFill>
+                  <a:latin typeface="Tw Cen MT" charset="0"/>
+                  <a:ea typeface="Tw Cen MT" charset="0"/>
+                  <a:cs typeface="Tw Cen MT" charset="0"/>
+                </a:rPr>
+                <a:t>An exploit without payload used for scanning, fuzzing and other automated tasks</a:t>
+              </a:r>
+            </a:p>
+            <a:p>
+              <a:pPr marL="285750" indent="-285750">
+                <a:buFont typeface="Arial" charset="0"/>
+                <a:buChar char="•"/>
+              </a:pPr>
+              <a:r>
+                <a:rPr lang="en-US" sz="1600" b="1" dirty="0" smtClean="0">
+                  <a:solidFill>
+                    <a:srgbClr val="C00000"/>
+                  </a:solidFill>
+                  <a:latin typeface="Tw Cen MT" charset="0"/>
+                  <a:ea typeface="Tw Cen MT" charset="0"/>
+                  <a:cs typeface="Tw Cen MT" charset="0"/>
+                </a:rPr>
+                <a:t>Encoders : </a:t>
+              </a:r>
+              <a:r>
+                <a:rPr lang="en-US" sz="1600" dirty="0" smtClean="0">
+                  <a:solidFill>
+                    <a:srgbClr val="C00000"/>
+                  </a:solidFill>
+                  <a:latin typeface="Tw Cen MT" charset="0"/>
+                  <a:ea typeface="Tw Cen MT" charset="0"/>
+                  <a:cs typeface="Tw Cen MT" charset="0"/>
+                </a:rPr>
+                <a:t>To encrypt payloads and evade anti-viruses</a:t>
+              </a:r>
+            </a:p>
+            <a:p>
+              <a:pPr marL="285750" indent="-285750">
+                <a:buFont typeface="Arial" charset="0"/>
+                <a:buChar char="•"/>
+              </a:pPr>
+              <a:r>
+                <a:rPr lang="en-US" sz="1600" b="1" dirty="0" smtClean="0">
+                  <a:solidFill>
+                    <a:srgbClr val="C00000"/>
+                  </a:solidFill>
+                  <a:latin typeface="Tw Cen MT" charset="0"/>
+                  <a:ea typeface="Tw Cen MT" charset="0"/>
+                  <a:cs typeface="Tw Cen MT" charset="0"/>
+                </a:rPr>
+                <a:t>Nops : </a:t>
+              </a:r>
+              <a:r>
+                <a:rPr lang="en-US" sz="1600" dirty="0" smtClean="0">
+                  <a:solidFill>
+                    <a:srgbClr val="C00000"/>
+                  </a:solidFill>
+                  <a:latin typeface="Tw Cen MT" charset="0"/>
+                  <a:ea typeface="Tw Cen MT" charset="0"/>
+                  <a:cs typeface="Tw Cen MT" charset="0"/>
+                </a:rPr>
+                <a:t>Mainly used to keep the size of the payload consistent</a:t>
+              </a:r>
+            </a:p>
+            <a:p>
+              <a:pPr marL="285750" indent="-285750">
+                <a:buFont typeface="Arial" charset="0"/>
+                <a:buChar char="•"/>
+              </a:pPr>
+              <a:r>
+                <a:rPr lang="en-US" sz="1600" b="1" dirty="0" smtClean="0">
+                  <a:solidFill>
+                    <a:srgbClr val="C00000"/>
+                  </a:solidFill>
+                  <a:latin typeface="Tw Cen MT" charset="0"/>
+                  <a:ea typeface="Tw Cen MT" charset="0"/>
+                  <a:cs typeface="Tw Cen MT" charset="0"/>
+                </a:rPr>
+                <a:t>Post : </a:t>
+              </a:r>
+              <a:r>
+                <a:rPr lang="en-US" sz="1600" dirty="0" smtClean="0">
+                  <a:solidFill>
+                    <a:srgbClr val="C00000"/>
+                  </a:solidFill>
+                  <a:latin typeface="Tw Cen MT" charset="0"/>
+                  <a:ea typeface="Tw Cen MT" charset="0"/>
+                  <a:cs typeface="Tw Cen MT" charset="0"/>
+                </a:rPr>
+                <a:t>To perform further attacks on the system after the system has been compromised, for instance, spying on the webcam, key logging etc.</a:t>
+              </a:r>
+              <a:endParaRPr lang="en-US" sz="1600" b="1" dirty="0" smtClean="0">
+                <a:solidFill>
+                  <a:srgbClr val="C00000"/>
+                </a:solidFill>
+                <a:latin typeface="Tw Cen MT" charset="0"/>
+                <a:ea typeface="Tw Cen MT" charset="0"/>
+                <a:cs typeface="Tw Cen MT" charset="0"/>
+              </a:endParaRPr>
+            </a:p>
+            <a:p>
+              <a:pPr marL="285750" indent="-285750">
+                <a:buFont typeface="Arial" charset="0"/>
+                <a:buChar char="•"/>
+              </a:pPr>
+              <a:endParaRPr lang="en-US" sz="1600" dirty="0">
                 <a:solidFill>
                   <a:srgbClr val="C00000"/>
                 </a:solidFill>
@@ -5706,11 +5266,14 @@
         </p:nvGrpSpPr>
         <p:grpSpPr>
           <a:xfrm>
-            <a:off x="-10288843" y="0"/>
+            <a:off x="-8663466" y="15388"/>
             <a:ext cx="11364686" cy="6858000"/>
             <a:chOff x="-4301700" y="0"/>
             <a:chExt cx="11364686" cy="6858000"/>
           </a:xfrm>
+          <a:solidFill>
+            <a:srgbClr val="D48888"/>
+          </a:solidFill>
         </p:grpSpPr>
         <p:grpSp>
           <p:nvGrpSpPr>
@@ -5725,6 +5288,7 @@
               <a:chOff x="-5116286" y="0"/>
               <a:chExt cx="11364686" cy="6858000"/>
             </a:xfrm>
+            <a:grpFill/>
             <a:effectLst>
               <a:outerShdw blurRad="254000" dist="88900" algn="l" rotWithShape="0">
                 <a:prstClr val="black">
@@ -5747,9 +5311,7 @@
               <a:prstGeom prst="rect">
                 <a:avLst/>
               </a:prstGeom>
-              <a:solidFill>
-                <a:srgbClr val="ED3D64"/>
-              </a:solidFill>
+              <a:grpFill/>
               <a:ln>
                 <a:noFill/>
               </a:ln>
@@ -5787,14 +5349,12 @@
             </p:nvGrpSpPr>
             <p:grpSpPr>
               <a:xfrm>
-                <a:off x="5780314" y="2193467"/>
+                <a:off x="5780314" y="2393164"/>
                 <a:ext cx="468086" cy="555171"/>
-                <a:chOff x="10896600" y="3151414"/>
+                <a:chOff x="10896600" y="3351111"/>
                 <a:chExt cx="468086" cy="555171"/>
               </a:xfrm>
-              <a:solidFill>
-                <a:srgbClr val="ED3D64"/>
-              </a:solidFill>
+              <a:grpFill/>
             </p:grpSpPr>
             <p:sp>
               <p:nvSpPr>
@@ -5804,7 +5364,7 @@
               </p:nvSpPr>
               <p:spPr>
                 <a:xfrm rot="5400000">
-                  <a:off x="10853057" y="3194957"/>
+                  <a:off x="10853057" y="3394654"/>
                   <a:ext cx="555171" cy="468086"/>
                 </a:xfrm>
                 <a:prstGeom prst="round2SameRect">
@@ -5848,7 +5408,7 @@
               </p:nvSpPr>
               <p:spPr>
                 <a:xfrm>
-                  <a:off x="10972799" y="3167390"/>
+                  <a:off x="10972799" y="3377591"/>
                   <a:ext cx="315687" cy="492443"/>
                 </a:xfrm>
                 <a:prstGeom prst="rect">
@@ -5865,22 +5425,14 @@
                   <a:r>
                     <a:rPr lang="en-US" sz="2600" b="1" dirty="0">
                       <a:solidFill>
-                        <a:srgbClr val="EE5D83"/>
+                        <a:srgbClr val="F39C98"/>
                       </a:solidFill>
                       <a:latin typeface="Calibri" charset="0"/>
                       <a:ea typeface="Calibri" charset="0"/>
                       <a:cs typeface="Calibri" charset="0"/>
                     </a:rPr>
-                    <a:t>6</a:t>
+                    <a:t>5</a:t>
                   </a:r>
-                  <a:endParaRPr lang="en-US" sz="2600" b="1" dirty="0">
-                    <a:solidFill>
-                      <a:srgbClr val="EE5D83"/>
-                    </a:solidFill>
-                    <a:latin typeface="Calibri" charset="0"/>
-                    <a:ea typeface="Calibri" charset="0"/>
-                    <a:cs typeface="Calibri" charset="0"/>
-                  </a:endParaRPr>
                 </a:p>
               </p:txBody>
             </p:sp>
@@ -5894,13 +5446,238 @@
           </p:nvSpPr>
           <p:spPr>
             <a:xfrm>
+              <a:off x="455782" y="738122"/>
+              <a:ext cx="5070898" cy="400110"/>
+            </a:xfrm>
+            <a:prstGeom prst="rect">
+              <a:avLst/>
+            </a:prstGeom>
+            <a:grpFill/>
+          </p:spPr>
+          <p:txBody>
+            <a:bodyPr wrap="square" rtlCol="0">
+              <a:spAutoFit/>
+            </a:bodyPr>
+            <a:lstStyle/>
+            <a:p>
+              <a:r>
+                <a:rPr lang="en-US" sz="2000" b="1" dirty="0" smtClean="0">
+                  <a:solidFill>
+                    <a:srgbClr val="F39C98"/>
+                  </a:solidFill>
+                  <a:latin typeface="Tw Cen MT" charset="0"/>
+                  <a:ea typeface="Tw Cen MT" charset="0"/>
+                  <a:cs typeface="Tw Cen MT" charset="0"/>
+                </a:rPr>
+                <a:t>Some popular attacks</a:t>
+              </a:r>
+              <a:endParaRPr lang="en-US" sz="2000" b="1" dirty="0">
+                <a:solidFill>
+                  <a:srgbClr val="F39C98"/>
+                </a:solidFill>
+                <a:latin typeface="Tw Cen MT" charset="0"/>
+                <a:ea typeface="Tw Cen MT" charset="0"/>
+                <a:cs typeface="Tw Cen MT" charset="0"/>
+              </a:endParaRPr>
+            </a:p>
+          </p:txBody>
+        </p:sp>
+      </p:grpSp>
+      <p:grpSp>
+        <p:nvGrpSpPr>
+          <p:cNvPr id="157" name="Group 156"/>
+          <p:cNvGrpSpPr/>
+          <p:nvPr/>
+        </p:nvGrpSpPr>
+        <p:grpSpPr>
+          <a:xfrm>
+            <a:off x="-9577473" y="15388"/>
+            <a:ext cx="11364686" cy="6858000"/>
+            <a:chOff x="-4301700" y="0"/>
+            <a:chExt cx="11364686" cy="6858000"/>
+          </a:xfrm>
+          <a:solidFill>
+            <a:srgbClr val="B3767D"/>
+          </a:solidFill>
+        </p:grpSpPr>
+        <p:grpSp>
+          <p:nvGrpSpPr>
+            <p:cNvPr id="158" name="Group 157"/>
+            <p:cNvGrpSpPr/>
+            <p:nvPr/>
+          </p:nvGrpSpPr>
+          <p:grpSpPr>
+            <a:xfrm>
+              <a:off x="-4301700" y="0"/>
+              <a:ext cx="11364686" cy="6858000"/>
+              <a:chOff x="-5116286" y="0"/>
+              <a:chExt cx="11364686" cy="6858000"/>
+            </a:xfrm>
+            <a:grpFill/>
+            <a:effectLst>
+              <a:outerShdw blurRad="254000" dist="88900" algn="l" rotWithShape="0">
+                <a:prstClr val="black">
+                  <a:alpha val="51000"/>
+                </a:prstClr>
+              </a:outerShdw>
+            </a:effectLst>
+          </p:grpSpPr>
+          <p:sp>
+            <p:nvSpPr>
+              <p:cNvPr id="160" name="Rectangle 159"/>
+              <p:cNvSpPr/>
+              <p:nvPr/>
+            </p:nvSpPr>
+            <p:spPr>
+              <a:xfrm>
+                <a:off x="-5116286" y="0"/>
+                <a:ext cx="10896600" cy="6858000"/>
+              </a:xfrm>
+              <a:prstGeom prst="rect">
+                <a:avLst/>
+              </a:prstGeom>
+              <a:grpFill/>
+              <a:ln>
+                <a:noFill/>
+              </a:ln>
+            </p:spPr>
+            <p:style>
+              <a:lnRef idx="2">
+                <a:schemeClr val="accent1">
+                  <a:shade val="50000"/>
+                </a:schemeClr>
+              </a:lnRef>
+              <a:fillRef idx="1">
+                <a:schemeClr val="accent1"/>
+              </a:fillRef>
+              <a:effectRef idx="0">
+                <a:schemeClr val="accent1"/>
+              </a:effectRef>
+              <a:fontRef idx="minor">
+                <a:schemeClr val="lt1"/>
+              </a:fontRef>
+            </p:style>
+            <p:txBody>
+              <a:bodyPr rtlCol="0" anchor="ctr"/>
+              <a:lstStyle/>
+              <a:p>
+                <a:pPr algn="ctr"/>
+                <a:endParaRPr lang="en-US"/>
+              </a:p>
+            </p:txBody>
+          </p:sp>
+          <p:grpSp>
+            <p:nvGrpSpPr>
+              <p:cNvPr id="162" name="Group 161"/>
+              <p:cNvGrpSpPr/>
+              <p:nvPr/>
+            </p:nvGrpSpPr>
+            <p:grpSpPr>
+              <a:xfrm>
+                <a:off x="5780314" y="2209225"/>
+                <a:ext cx="468086" cy="555171"/>
+                <a:chOff x="10896600" y="3167172"/>
+                <a:chExt cx="468086" cy="555171"/>
+              </a:xfrm>
+              <a:grpFill/>
+            </p:grpSpPr>
+            <p:sp>
+              <p:nvSpPr>
+                <p:cNvPr id="163" name="Round Same Side Corner Rectangle 162"/>
+                <p:cNvSpPr/>
+                <p:nvPr/>
+              </p:nvSpPr>
+              <p:spPr>
+                <a:xfrm rot="5400000">
+                  <a:off x="10853057" y="3210715"/>
+                  <a:ext cx="555171" cy="468086"/>
+                </a:xfrm>
+                <a:prstGeom prst="round2SameRect">
+                  <a:avLst/>
+                </a:prstGeom>
+                <a:grpFill/>
+                <a:ln>
+                  <a:noFill/>
+                </a:ln>
+              </p:spPr>
+              <p:style>
+                <a:lnRef idx="2">
+                  <a:schemeClr val="accent1">
+                    <a:shade val="50000"/>
+                  </a:schemeClr>
+                </a:lnRef>
+                <a:fillRef idx="1">
+                  <a:schemeClr val="accent1"/>
+                </a:fillRef>
+                <a:effectRef idx="0">
+                  <a:schemeClr val="accent1"/>
+                </a:effectRef>
+                <a:fontRef idx="minor">
+                  <a:schemeClr val="lt1"/>
+                </a:fontRef>
+              </p:style>
+              <p:txBody>
+                <a:bodyPr rtlCol="0" anchor="ctr"/>
+                <a:lstStyle/>
+                <a:p>
+                  <a:pPr algn="ctr"/>
+                  <a:endParaRPr lang="en-US"/>
+                </a:p>
+              </p:txBody>
+            </p:sp>
+            <p:sp>
+              <p:nvSpPr>
+                <p:cNvPr id="164" name="TextBox 163"/>
+                <p:cNvSpPr txBox="1"/>
+                <p:nvPr/>
+              </p:nvSpPr>
+              <p:spPr>
+                <a:xfrm>
+                  <a:off x="10945601" y="3190571"/>
+                  <a:ext cx="315687" cy="492443"/>
+                </a:xfrm>
+                <a:prstGeom prst="rect">
+                  <a:avLst/>
+                </a:prstGeom>
+                <a:grpFill/>
+              </p:spPr>
+              <p:txBody>
+                <a:bodyPr wrap="square" rtlCol="0">
+                  <a:spAutoFit/>
+                </a:bodyPr>
+                <a:lstStyle/>
+                <a:p>
+                  <a:r>
+                    <a:rPr lang="en-US" sz="2600" b="1" dirty="0">
+                      <a:solidFill>
+                        <a:srgbClr val="D48888"/>
+                      </a:solidFill>
+                      <a:latin typeface="Calibri" charset="0"/>
+                      <a:ea typeface="Calibri" charset="0"/>
+                      <a:cs typeface="Calibri" charset="0"/>
+                    </a:rPr>
+                    <a:t>6</a:t>
+                  </a:r>
+                </a:p>
+              </p:txBody>
+            </p:sp>
+          </p:grpSp>
+        </p:grpSp>
+        <p:sp>
+          <p:nvSpPr>
+            <p:cNvPr id="159" name="TextBox 158"/>
+            <p:cNvSpPr txBox="1"/>
+            <p:nvPr/>
+          </p:nvSpPr>
+          <p:spPr>
+            <a:xfrm>
               <a:off x="-125185" y="2017958"/>
               <a:ext cx="5070898" cy="830997"/>
             </a:xfrm>
             <a:prstGeom prst="rect">
               <a:avLst/>
             </a:prstGeom>
-            <a:noFill/>
+            <a:grpFill/>
           </p:spPr>
           <p:txBody>
             <a:bodyPr wrap="square" rtlCol="0">
@@ -5968,7 +5745,7 @@
                                     <p:cond delay="0"/>
                                   </p:stCondLst>
                                   <p:childTnLst>
-                                    <p:animMotion origin="layout" path="M 0.22148 0 L 0.47148 0 " pathEditMode="relative" rAng="0" ptsTypes="AA">
+                                    <p:animMotion origin="layout" path="M 0.22149 0 L 0.47149 0 " pathEditMode="relative" rAng="0" ptsTypes="AA">
                                       <p:cBhvr>
                                         <p:cTn id="6" dur="1250" fill="hold"/>
                                         <p:tgtEl>
@@ -6008,7 +5785,7 @@
                                     <p:cond delay="0"/>
                                   </p:stCondLst>
                                   <p:childTnLst>
-                                    <p:animMotion origin="layout" path="M 0.225 0 L 0.47696 0 " pathEditMode="relative" rAng="0" ptsTypes="AA">
+                                    <p:animMotion origin="layout" path="M 0.225 2.59259E-6 L 0.47695 2.59259E-6 " pathEditMode="relative" rAng="0" ptsTypes="AA">
                                       <p:cBhvr>
                                         <p:cTn id="10" dur="1250" fill="hold"/>
                                         <p:tgtEl>
@@ -6048,7 +5825,7 @@
                                     <p:cond delay="0"/>
                                   </p:stCondLst>
                                   <p:childTnLst>
-                                    <p:animMotion origin="layout" path="M 2.08333E-7 0 L 0.48893 0 " pathEditMode="relative" rAng="0" ptsTypes="AA">
+                                    <p:animMotion origin="layout" path="M 1.25E-6 0 L 0.48893 0 " pathEditMode="relative" rAng="0" ptsTypes="AA">
                                       <p:cBhvr>
                                         <p:cTn id="14" dur="1250" fill="hold"/>
                                         <p:tgtEl>
@@ -6088,18 +5865,18 @@
                                     <p:cond delay="0"/>
                                   </p:stCondLst>
                                   <p:childTnLst>
-                                    <p:animMotion origin="layout" path="M 2.91667E-6 0 L 0.50208 0 " pathEditMode="relative" rAng="0" ptsTypes="AA">
+                                    <p:animMotion origin="layout" path="M -0.05364 0.00162 L 0.50118 0.00162 " pathEditMode="relative" rAng="0" ptsTypes="AA">
                                       <p:cBhvr>
                                         <p:cTn id="18" dur="1250" fill="hold"/>
                                         <p:tgtEl>
-                                          <p:spTgt spid="104"/>
+                                          <p:spTgt spid="142"/>
                                         </p:tgtEl>
                                         <p:attrNameLst>
                                           <p:attrName>ppt_x</p:attrName>
                                           <p:attrName>ppt_y</p:attrName>
                                         </p:attrNameLst>
                                       </p:cBhvr>
-                                      <p:rCtr x="25104" y="0"/>
+                                      <p:rCtr x="27734" y="0"/>
                                     </p:animMotion>
                                   </p:childTnLst>
                                 </p:cTn>
@@ -6128,18 +5905,18 @@
                                     <p:cond delay="0"/>
                                   </p:stCondLst>
                                   <p:childTnLst>
-                                    <p:animMotion origin="layout" path="M -0.04688 0 L 0.50794 0 " pathEditMode="relative" rAng="0" ptsTypes="AA">
+                                    <p:animMotion origin="layout" path="M 1.04167E-6 -4.81481E-6 L 0.5069 -4.81481E-6 " pathEditMode="relative" rAng="0" ptsTypes="AA">
                                       <p:cBhvr>
                                         <p:cTn id="22" dur="1250" fill="hold"/>
                                         <p:tgtEl>
-                                          <p:spTgt spid="142"/>
+                                          <p:spTgt spid="149"/>
                                         </p:tgtEl>
                                         <p:attrNameLst>
                                           <p:attrName>ppt_x</p:attrName>
                                           <p:attrName>ppt_y</p:attrName>
                                         </p:attrNameLst>
                                       </p:cBhvr>
-                                      <p:rCtr x="27747" y="0"/>
+                                      <p:rCtr x="25339" y="0"/>
                                     </p:animMotion>
                                   </p:childTnLst>
                                 </p:cTn>
@@ -6168,11 +5945,11 @@
                                     <p:cond delay="0"/>
                                   </p:stCondLst>
                                   <p:childTnLst>
-                                    <p:animMotion origin="layout" path="M 4.375E-6 0 L 0.5069 0 " pathEditMode="relative" rAng="0" ptsTypes="AA">
+                                    <p:animMotion origin="layout" path="M 1.04167E-6 -4.81481E-6 L 0.5069 -4.81481E-6 " pathEditMode="relative" rAng="0" ptsTypes="AA">
                                       <p:cBhvr>
                                         <p:cTn id="26" dur="1250" fill="hold"/>
                                         <p:tgtEl>
-                                          <p:spTgt spid="149"/>
+                                          <p:spTgt spid="157"/>
                                         </p:tgtEl>
                                         <p:attrNameLst>
                                           <p:attrName>ppt_x</p:attrName>
@@ -6474,4 +6251,265 @@
     </a:ext>
   </a:extLst>
 </a:theme>
+</file>
+
+<file path=ppt/theme/theme2.xml><?xml version="1.0" encoding="utf-8"?>
+<a:theme xmlns:a="http://schemas.openxmlformats.org/drawingml/2006/main" name="Office Theme">
+  <a:themeElements>
+    <a:clrScheme name="Office">
+      <a:dk1>
+        <a:sysClr val="windowText" lastClr="000000"/>
+      </a:dk1>
+      <a:lt1>
+        <a:sysClr val="window" lastClr="FFFFFF"/>
+      </a:lt1>
+      <a:dk2>
+        <a:srgbClr val="44546A"/>
+      </a:dk2>
+      <a:lt2>
+        <a:srgbClr val="E7E6E6"/>
+      </a:lt2>
+      <a:accent1>
+        <a:srgbClr val="5B9BD5"/>
+      </a:accent1>
+      <a:accent2>
+        <a:srgbClr val="ED7D31"/>
+      </a:accent2>
+      <a:accent3>
+        <a:srgbClr val="A5A5A5"/>
+      </a:accent3>
+      <a:accent4>
+        <a:srgbClr val="FFC000"/>
+      </a:accent4>
+      <a:accent5>
+        <a:srgbClr val="4472C4"/>
+      </a:accent5>
+      <a:accent6>
+        <a:srgbClr val="70AD47"/>
+      </a:accent6>
+      <a:hlink>
+        <a:srgbClr val="0563C1"/>
+      </a:hlink>
+      <a:folHlink>
+        <a:srgbClr val="954F72"/>
+      </a:folHlink>
+    </a:clrScheme>
+    <a:fontScheme name="Office">
+      <a:majorFont>
+        <a:latin typeface="Calibri Light" panose="020F0302020204030204"/>
+        <a:ea typeface=""/>
+        <a:cs typeface=""/>
+        <a:font script="Jpan" typeface="ＭＳ Ｐゴシック"/>
+        <a:font script="Hang" typeface="맑은 고딕"/>
+        <a:font script="Hans" typeface="宋体"/>
+        <a:font script="Hant" typeface="新細明體"/>
+        <a:font script="Arab" typeface="Times New Roman"/>
+        <a:font script="Hebr" typeface="Times New Roman"/>
+        <a:font script="Thai" typeface="Angsana New"/>
+        <a:font script="Ethi" typeface="Nyala"/>
+        <a:font script="Beng" typeface="Vrinda"/>
+        <a:font script="Gujr" typeface="Shruti"/>
+        <a:font script="Khmr" typeface="MoolBoran"/>
+        <a:font script="Knda" typeface="Tunga"/>
+        <a:font script="Guru" typeface="Raavi"/>
+        <a:font script="Cans" typeface="Euphemia"/>
+        <a:font script="Cher" typeface="Plantagenet Cherokee"/>
+        <a:font script="Yiii" typeface="Microsoft Yi Baiti"/>
+        <a:font script="Tibt" typeface="Microsoft Himalaya"/>
+        <a:font script="Thaa" typeface="MV Boli"/>
+        <a:font script="Deva" typeface="Mangal"/>
+        <a:font script="Telu" typeface="Gautami"/>
+        <a:font script="Taml" typeface="Latha"/>
+        <a:font script="Syrc" typeface="Estrangelo Edessa"/>
+        <a:font script="Orya" typeface="Kalinga"/>
+        <a:font script="Mlym" typeface="Kartika"/>
+        <a:font script="Laoo" typeface="DokChampa"/>
+        <a:font script="Sinh" typeface="Iskoola Pota"/>
+        <a:font script="Mong" typeface="Mongolian Baiti"/>
+        <a:font script="Viet" typeface="Times New Roman"/>
+        <a:font script="Uigh" typeface="Microsoft Uighur"/>
+        <a:font script="Geor" typeface="Sylfaen"/>
+      </a:majorFont>
+      <a:minorFont>
+        <a:latin typeface="Calibri" panose="020F0502020204030204"/>
+        <a:ea typeface=""/>
+        <a:cs typeface=""/>
+        <a:font script="Jpan" typeface="ＭＳ Ｐゴシック"/>
+        <a:font script="Hang" typeface="맑은 고딕"/>
+        <a:font script="Hans" typeface="宋体"/>
+        <a:font script="Hant" typeface="新細明體"/>
+        <a:font script="Arab" typeface="Arial"/>
+        <a:font script="Hebr" typeface="Arial"/>
+        <a:font script="Thai" typeface="Cordia New"/>
+        <a:font script="Ethi" typeface="Nyala"/>
+        <a:font script="Beng" typeface="Vrinda"/>
+        <a:font script="Gujr" typeface="Shruti"/>
+        <a:font script="Khmr" typeface="DaunPenh"/>
+        <a:font script="Knda" typeface="Tunga"/>
+        <a:font script="Guru" typeface="Raavi"/>
+        <a:font script="Cans" typeface="Euphemia"/>
+        <a:font script="Cher" typeface="Plantagenet Cherokee"/>
+        <a:font script="Yiii" typeface="Microsoft Yi Baiti"/>
+        <a:font script="Tibt" typeface="Microsoft Himalaya"/>
+        <a:font script="Thaa" typeface="MV Boli"/>
+        <a:font script="Deva" typeface="Mangal"/>
+        <a:font script="Telu" typeface="Gautami"/>
+        <a:font script="Taml" typeface="Latha"/>
+        <a:font script="Syrc" typeface="Estrangelo Edessa"/>
+        <a:font script="Orya" typeface="Kalinga"/>
+        <a:font script="Mlym" typeface="Kartika"/>
+        <a:font script="Laoo" typeface="DokChampa"/>
+        <a:font script="Sinh" typeface="Iskoola Pota"/>
+        <a:font script="Mong" typeface="Mongolian Baiti"/>
+        <a:font script="Viet" typeface="Arial"/>
+        <a:font script="Uigh" typeface="Microsoft Uighur"/>
+        <a:font script="Geor" typeface="Sylfaen"/>
+      </a:minorFont>
+    </a:fontScheme>
+    <a:fmtScheme name="Office">
+      <a:fillStyleLst>
+        <a:solidFill>
+          <a:schemeClr val="phClr"/>
+        </a:solidFill>
+        <a:gradFill rotWithShape="1">
+          <a:gsLst>
+            <a:gs pos="0">
+              <a:schemeClr val="phClr">
+                <a:lumMod val="110000"/>
+                <a:satMod val="105000"/>
+                <a:tint val="67000"/>
+              </a:schemeClr>
+            </a:gs>
+            <a:gs pos="50000">
+              <a:schemeClr val="phClr">
+                <a:lumMod val="105000"/>
+                <a:satMod val="103000"/>
+                <a:tint val="73000"/>
+              </a:schemeClr>
+            </a:gs>
+            <a:gs pos="100000">
+              <a:schemeClr val="phClr">
+                <a:lumMod val="105000"/>
+                <a:satMod val="109000"/>
+                <a:tint val="81000"/>
+              </a:schemeClr>
+            </a:gs>
+          </a:gsLst>
+          <a:lin ang="5400000" scaled="0"/>
+        </a:gradFill>
+        <a:gradFill rotWithShape="1">
+          <a:gsLst>
+            <a:gs pos="0">
+              <a:schemeClr val="phClr">
+                <a:satMod val="103000"/>
+                <a:lumMod val="102000"/>
+                <a:tint val="94000"/>
+              </a:schemeClr>
+            </a:gs>
+            <a:gs pos="50000">
+              <a:schemeClr val="phClr">
+                <a:satMod val="110000"/>
+                <a:lumMod val="100000"/>
+                <a:shade val="100000"/>
+              </a:schemeClr>
+            </a:gs>
+            <a:gs pos="100000">
+              <a:schemeClr val="phClr">
+                <a:lumMod val="99000"/>
+                <a:satMod val="120000"/>
+                <a:shade val="78000"/>
+              </a:schemeClr>
+            </a:gs>
+          </a:gsLst>
+          <a:lin ang="5400000" scaled="0"/>
+        </a:gradFill>
+      </a:fillStyleLst>
+      <a:lnStyleLst>
+        <a:ln w="6350" cap="flat" cmpd="sng" algn="ctr">
+          <a:solidFill>
+            <a:schemeClr val="phClr"/>
+          </a:solidFill>
+          <a:prstDash val="solid"/>
+          <a:miter lim="800000"/>
+        </a:ln>
+        <a:ln w="12700" cap="flat" cmpd="sng" algn="ctr">
+          <a:solidFill>
+            <a:schemeClr val="phClr"/>
+          </a:solidFill>
+          <a:prstDash val="solid"/>
+          <a:miter lim="800000"/>
+        </a:ln>
+        <a:ln w="19050" cap="flat" cmpd="sng" algn="ctr">
+          <a:solidFill>
+            <a:schemeClr val="phClr"/>
+          </a:solidFill>
+          <a:prstDash val="solid"/>
+          <a:miter lim="800000"/>
+        </a:ln>
+      </a:lnStyleLst>
+      <a:effectStyleLst>
+        <a:effectStyle>
+          <a:effectLst/>
+        </a:effectStyle>
+        <a:effectStyle>
+          <a:effectLst/>
+        </a:effectStyle>
+        <a:effectStyle>
+          <a:effectLst>
+            <a:outerShdw blurRad="57150" dist="19050" dir="5400000" algn="ctr" rotWithShape="0">
+              <a:srgbClr val="000000">
+                <a:alpha val="63000"/>
+              </a:srgbClr>
+            </a:outerShdw>
+          </a:effectLst>
+        </a:effectStyle>
+      </a:effectStyleLst>
+      <a:bgFillStyleLst>
+        <a:solidFill>
+          <a:schemeClr val="phClr"/>
+        </a:solidFill>
+        <a:solidFill>
+          <a:schemeClr val="phClr">
+            <a:tint val="95000"/>
+            <a:satMod val="170000"/>
+          </a:schemeClr>
+        </a:solidFill>
+        <a:gradFill rotWithShape="1">
+          <a:gsLst>
+            <a:gs pos="0">
+              <a:schemeClr val="phClr">
+                <a:tint val="93000"/>
+                <a:satMod val="150000"/>
+                <a:shade val="98000"/>
+                <a:lumMod val="102000"/>
+              </a:schemeClr>
+            </a:gs>
+            <a:gs pos="50000">
+              <a:schemeClr val="phClr">
+                <a:tint val="98000"/>
+                <a:satMod val="130000"/>
+                <a:shade val="90000"/>
+                <a:lumMod val="103000"/>
+              </a:schemeClr>
+            </a:gs>
+            <a:gs pos="100000">
+              <a:schemeClr val="phClr">
+                <a:shade val="63000"/>
+                <a:satMod val="120000"/>
+              </a:schemeClr>
+            </a:gs>
+          </a:gsLst>
+          <a:lin ang="5400000" scaled="0"/>
+        </a:gradFill>
+      </a:bgFillStyleLst>
+    </a:fmtScheme>
+  </a:themeElements>
+  <a:objectDefaults/>
+  <a:extraClrSchemeLst/>
+  <a:extLst>
+    <a:ext uri="{05A4C25C-085E-4340-85A3-A5531E510DB2}">
+      <thm15:themeFamily xmlns:thm15="http://schemas.microsoft.com/office/thememl/2012/main" name="Office Theme" id="{62F939B6-93AF-4DB8-9C6B-D6C7DFDC589F}" vid="{4A3C46E8-61CC-4603-A589-7422A47A8E4A}"/>
+    </a:ext>
+  </a:extLst>
+</a:theme>
 </file>
</xml_diff>

<commit_message>
wireless assignment complete and hacking ppt ready
</commit_message>
<xml_diff>
--- a/Metasploit.pptx
+++ b/Metasploit.pptx
@@ -197,7 +197,7 @@
           <a:p>
             <a:fld id="{780D03CD-C28F-6D4F-8549-6E228DCCDA39}" type="datetimeFigureOut">
               <a:rPr lang="en-US" smtClean="0"/>
-              <a:t>2/26/18</a:t>
+              <a:t>2/28/18</a:t>
             </a:fld>
             <a:endParaRPr lang="en-US"/>
           </a:p>
@@ -680,7 +680,7 @@
           <a:p>
             <a:fld id="{84C96F59-D577-FA43-AC56-D4CAF65691F2}" type="datetimeFigureOut">
               <a:rPr lang="en-US" smtClean="0"/>
-              <a:t>2/26/18</a:t>
+              <a:t>2/28/18</a:t>
             </a:fld>
             <a:endParaRPr lang="en-US"/>
           </a:p>
@@ -850,7 +850,7 @@
           <a:p>
             <a:fld id="{84C96F59-D577-FA43-AC56-D4CAF65691F2}" type="datetimeFigureOut">
               <a:rPr lang="en-US" smtClean="0"/>
-              <a:t>2/26/18</a:t>
+              <a:t>2/28/18</a:t>
             </a:fld>
             <a:endParaRPr lang="en-US"/>
           </a:p>
@@ -1030,7 +1030,7 @@
           <a:p>
             <a:fld id="{84C96F59-D577-FA43-AC56-D4CAF65691F2}" type="datetimeFigureOut">
               <a:rPr lang="en-US" smtClean="0"/>
-              <a:t>2/26/18</a:t>
+              <a:t>2/28/18</a:t>
             </a:fld>
             <a:endParaRPr lang="en-US"/>
           </a:p>
@@ -1200,7 +1200,7 @@
           <a:p>
             <a:fld id="{84C96F59-D577-FA43-AC56-D4CAF65691F2}" type="datetimeFigureOut">
               <a:rPr lang="en-US" smtClean="0"/>
-              <a:t>2/26/18</a:t>
+              <a:t>2/28/18</a:t>
             </a:fld>
             <a:endParaRPr lang="en-US"/>
           </a:p>
@@ -1446,7 +1446,7 @@
           <a:p>
             <a:fld id="{84C96F59-D577-FA43-AC56-D4CAF65691F2}" type="datetimeFigureOut">
               <a:rPr lang="en-US" smtClean="0"/>
-              <a:t>2/26/18</a:t>
+              <a:t>2/28/18</a:t>
             </a:fld>
             <a:endParaRPr lang="en-US"/>
           </a:p>
@@ -1678,7 +1678,7 @@
           <a:p>
             <a:fld id="{84C96F59-D577-FA43-AC56-D4CAF65691F2}" type="datetimeFigureOut">
               <a:rPr lang="en-US" smtClean="0"/>
-              <a:t>2/26/18</a:t>
+              <a:t>2/28/18</a:t>
             </a:fld>
             <a:endParaRPr lang="en-US"/>
           </a:p>
@@ -2045,7 +2045,7 @@
           <a:p>
             <a:fld id="{84C96F59-D577-FA43-AC56-D4CAF65691F2}" type="datetimeFigureOut">
               <a:rPr lang="en-US" smtClean="0"/>
-              <a:t>2/26/18</a:t>
+              <a:t>2/28/18</a:t>
             </a:fld>
             <a:endParaRPr lang="en-US"/>
           </a:p>
@@ -2163,7 +2163,7 @@
           <a:p>
             <a:fld id="{84C96F59-D577-FA43-AC56-D4CAF65691F2}" type="datetimeFigureOut">
               <a:rPr lang="en-US" smtClean="0"/>
-              <a:t>2/26/18</a:t>
+              <a:t>2/28/18</a:t>
             </a:fld>
             <a:endParaRPr lang="en-US"/>
           </a:p>
@@ -2258,7 +2258,7 @@
           <a:p>
             <a:fld id="{84C96F59-D577-FA43-AC56-D4CAF65691F2}" type="datetimeFigureOut">
               <a:rPr lang="en-US" smtClean="0"/>
-              <a:t>2/26/18</a:t>
+              <a:t>2/28/18</a:t>
             </a:fld>
             <a:endParaRPr lang="en-US"/>
           </a:p>
@@ -2535,7 +2535,7 @@
           <a:p>
             <a:fld id="{84C96F59-D577-FA43-AC56-D4CAF65691F2}" type="datetimeFigureOut">
               <a:rPr lang="en-US" smtClean="0"/>
-              <a:t>2/26/18</a:t>
+              <a:t>2/28/18</a:t>
             </a:fld>
             <a:endParaRPr lang="en-US"/>
           </a:p>
@@ -2788,7 +2788,7 @@
           <a:p>
             <a:fld id="{84C96F59-D577-FA43-AC56-D4CAF65691F2}" type="datetimeFigureOut">
               <a:rPr lang="en-US" smtClean="0"/>
-              <a:t>2/26/18</a:t>
+              <a:t>2/28/18</a:t>
             </a:fld>
             <a:endParaRPr lang="en-US"/>
           </a:p>
@@ -3001,7 +3001,7 @@
           <a:p>
             <a:fld id="{84C96F59-D577-FA43-AC56-D4CAF65691F2}" type="datetimeFigureOut">
               <a:rPr lang="en-US" smtClean="0"/>
-              <a:t>2/26/18</a:t>
+              <a:t>2/28/18</a:t>
             </a:fld>
             <a:endParaRPr lang="en-US"/>
           </a:p>
@@ -5266,7 +5266,7 @@
         </p:nvGrpSpPr>
         <p:grpSpPr>
           <a:xfrm>
-            <a:off x="-8663466" y="15388"/>
+            <a:off x="-8673976" y="4878"/>
             <a:ext cx="11364686" cy="6858000"/>
             <a:chOff x="-4301700" y="0"/>
             <a:chExt cx="11364686" cy="6858000"/>
@@ -5337,7 +5337,11 @@
               <a:lstStyle/>
               <a:p>
                 <a:pPr algn="ctr"/>
-                <a:endParaRPr lang="en-US"/>
+                <a:endParaRPr lang="en-US">
+                  <a:solidFill>
+                    <a:srgbClr val="FFE2E3"/>
+                  </a:solidFill>
+                </a:endParaRPr>
               </a:p>
             </p:txBody>
           </p:sp>
@@ -5447,7 +5451,7 @@
           <p:spPr>
             <a:xfrm>
               <a:off x="455782" y="738122"/>
-              <a:ext cx="5070898" cy="400110"/>
+              <a:ext cx="5070898" cy="4647426"/>
             </a:xfrm>
             <a:prstGeom prst="rect">
               <a:avLst/>
@@ -5463,17 +5467,272 @@
               <a:r>
                 <a:rPr lang="en-US" sz="2000" b="1" dirty="0" smtClean="0">
                   <a:solidFill>
-                    <a:srgbClr val="F39C98"/>
+                    <a:srgbClr val="FEF4F0"/>
                   </a:solidFill>
                   <a:latin typeface="Tw Cen MT" charset="0"/>
                   <a:ea typeface="Tw Cen MT" charset="0"/>
                   <a:cs typeface="Tw Cen MT" charset="0"/>
                 </a:rPr>
-                <a:t>Some popular attacks</a:t>
+                <a:t>Attack phases</a:t>
               </a:r>
+            </a:p>
+            <a:p>
               <a:endParaRPr lang="en-US" sz="2000" b="1" dirty="0">
                 <a:solidFill>
-                  <a:srgbClr val="F39C98"/>
+                  <a:srgbClr val="FEF4F0"/>
+                </a:solidFill>
+                <a:latin typeface="Tw Cen MT" charset="0"/>
+                <a:ea typeface="Tw Cen MT" charset="0"/>
+                <a:cs typeface="Tw Cen MT" charset="0"/>
+              </a:endParaRPr>
+            </a:p>
+            <a:p>
+              <a:pPr marL="285750" indent="-285750">
+                <a:buFont typeface="Arial" charset="0"/>
+                <a:buChar char="•"/>
+              </a:pPr>
+              <a:r>
+                <a:rPr lang="en-US" sz="1600" b="1" dirty="0" smtClean="0">
+                  <a:solidFill>
+                    <a:srgbClr val="FEF4F0"/>
+                  </a:solidFill>
+                  <a:latin typeface="Tw Cen MT" charset="0"/>
+                  <a:ea typeface="Tw Cen MT" charset="0"/>
+                  <a:cs typeface="Tw Cen MT" charset="0"/>
+                </a:rPr>
+                <a:t>Pre-Attack</a:t>
+              </a:r>
+            </a:p>
+            <a:p>
+              <a:pPr marL="742950" lvl="1" indent="-285750">
+                <a:buFont typeface="Arial" charset="0"/>
+                <a:buChar char="•"/>
+              </a:pPr>
+              <a:r>
+                <a:rPr lang="en-US" sz="1600" dirty="0" smtClean="0">
+                  <a:solidFill>
+                    <a:srgbClr val="FEF4F0"/>
+                  </a:solidFill>
+                  <a:latin typeface="Tw Cen MT" charset="0"/>
+                  <a:ea typeface="Tw Cen MT" charset="0"/>
+                  <a:cs typeface="Tw Cen MT" charset="0"/>
+                </a:rPr>
+                <a:t>create a listener on a port</a:t>
+              </a:r>
+            </a:p>
+            <a:p>
+              <a:pPr marL="742950" lvl="1" indent="-285750">
+                <a:buFont typeface="Arial" charset="0"/>
+                <a:buChar char="•"/>
+              </a:pPr>
+              <a:r>
+                <a:rPr lang="en-US" sz="1600" dirty="0" smtClean="0">
+                  <a:solidFill>
+                    <a:srgbClr val="FEF4F0"/>
+                  </a:solidFill>
+                  <a:latin typeface="Tw Cen MT" charset="0"/>
+                  <a:ea typeface="Tw Cen MT" charset="0"/>
+                  <a:cs typeface="Tw Cen MT" charset="0"/>
+                </a:rPr>
+                <a:t> create a malicious </a:t>
+              </a:r>
+              <a:r>
+                <a:rPr lang="en-US" sz="1600" dirty="0" err="1" smtClean="0">
+                  <a:solidFill>
+                    <a:srgbClr val="FEF4F0"/>
+                  </a:solidFill>
+                  <a:latin typeface="Tw Cen MT" charset="0"/>
+                  <a:ea typeface="Tw Cen MT" charset="0"/>
+                  <a:cs typeface="Tw Cen MT" charset="0"/>
+                </a:rPr>
+                <a:t>apk</a:t>
+              </a:r>
+              <a:r>
+                <a:rPr lang="en-US" sz="1600" dirty="0" smtClean="0">
+                  <a:solidFill>
+                    <a:srgbClr val="FEF4F0"/>
+                  </a:solidFill>
+                  <a:latin typeface="Tw Cen MT" charset="0"/>
+                  <a:ea typeface="Tw Cen MT" charset="0"/>
+                  <a:cs typeface="Tw Cen MT" charset="0"/>
+                </a:rPr>
+                <a:t> file</a:t>
+              </a:r>
+            </a:p>
+            <a:p>
+              <a:pPr marL="742950" lvl="1" indent="-285750">
+                <a:buFont typeface="Arial" charset="0"/>
+                <a:buChar char="•"/>
+              </a:pPr>
+              <a:r>
+                <a:rPr lang="en-US" sz="1600" dirty="0" smtClean="0">
+                  <a:solidFill>
+                    <a:srgbClr val="FEF4F0"/>
+                  </a:solidFill>
+                  <a:latin typeface="Tw Cen MT" charset="0"/>
+                  <a:ea typeface="Tw Cen MT" charset="0"/>
+                  <a:cs typeface="Tw Cen MT" charset="0"/>
+                </a:rPr>
+                <a:t>create a malicious file such as a pdf file</a:t>
+              </a:r>
+            </a:p>
+            <a:p>
+              <a:pPr marL="742950" lvl="1" indent="-285750">
+                <a:buFont typeface="Arial" charset="0"/>
+                <a:buChar char="•"/>
+              </a:pPr>
+              <a:r>
+                <a:rPr lang="en-US" sz="1600" dirty="0" smtClean="0">
+                  <a:solidFill>
+                    <a:srgbClr val="FEF4F0"/>
+                  </a:solidFill>
+                  <a:latin typeface="Tw Cen MT" charset="0"/>
+                  <a:ea typeface="Tw Cen MT" charset="0"/>
+                  <a:cs typeface="Tw Cen MT" charset="0"/>
+                </a:rPr>
+                <a:t>create a malicious extension</a:t>
+              </a:r>
+            </a:p>
+            <a:p>
+              <a:pPr marL="742950" lvl="1" indent="-285750">
+                <a:buFont typeface="Arial" charset="0"/>
+                <a:buChar char="•"/>
+              </a:pPr>
+              <a:r>
+                <a:rPr lang="en-US" sz="1600" dirty="0" smtClean="0">
+                  <a:solidFill>
+                    <a:srgbClr val="FEF4F0"/>
+                  </a:solidFill>
+                  <a:latin typeface="Tw Cen MT" charset="0"/>
+                  <a:ea typeface="Tw Cen MT" charset="0"/>
+                  <a:cs typeface="Tw Cen MT" charset="0"/>
+                </a:rPr>
+                <a:t>create a malicious executable file etc.</a:t>
+              </a:r>
+            </a:p>
+            <a:p>
+              <a:pPr marL="285750" indent="-285750">
+                <a:buFont typeface="Arial" charset="0"/>
+                <a:buChar char="•"/>
+              </a:pPr>
+              <a:r>
+                <a:rPr lang="en-US" sz="1600" b="1" dirty="0" smtClean="0">
+                  <a:solidFill>
+                    <a:srgbClr val="FEF4F0"/>
+                  </a:solidFill>
+                  <a:latin typeface="Tw Cen MT" charset="0"/>
+                  <a:ea typeface="Tw Cen MT" charset="0"/>
+                  <a:cs typeface="Tw Cen MT" charset="0"/>
+                </a:rPr>
+                <a:t>Attack</a:t>
+              </a:r>
+            </a:p>
+            <a:p>
+              <a:pPr marL="742950" lvl="1" indent="-285750">
+                <a:buFont typeface="Arial" charset="0"/>
+                <a:buChar char="•"/>
+              </a:pPr>
+              <a:r>
+                <a:rPr lang="en-US" sz="1600" dirty="0">
+                  <a:solidFill>
+                    <a:srgbClr val="FEF4F0"/>
+                  </a:solidFill>
+                  <a:latin typeface="Tw Cen MT" charset="0"/>
+                  <a:ea typeface="Tw Cen MT" charset="0"/>
+                  <a:cs typeface="Tw Cen MT" charset="0"/>
+                </a:rPr>
+                <a:t>Perform different activities based on the type of payload you have used for exploiting such as taking a screenshots</a:t>
+              </a:r>
+              <a:r>
+                <a:rPr lang="en-US" sz="1600" dirty="0" smtClean="0">
+                  <a:solidFill>
+                    <a:srgbClr val="FEF4F0"/>
+                  </a:solidFill>
+                  <a:latin typeface="Tw Cen MT" charset="0"/>
+                  <a:ea typeface="Tw Cen MT" charset="0"/>
+                  <a:cs typeface="Tw Cen MT" charset="0"/>
+                </a:rPr>
+                <a:t>.</a:t>
+              </a:r>
+            </a:p>
+            <a:p>
+              <a:pPr marL="742950" lvl="1" indent="-285750">
+                <a:buFont typeface="Arial" charset="0"/>
+                <a:buChar char="•"/>
+              </a:pPr>
+              <a:r>
+                <a:rPr lang="en-US" sz="1600" dirty="0" smtClean="0">
+                  <a:solidFill>
+                    <a:srgbClr val="FEF4F0"/>
+                  </a:solidFill>
+                  <a:latin typeface="Tw Cen MT" charset="0"/>
+                  <a:ea typeface="Tw Cen MT" charset="0"/>
+                  <a:cs typeface="Tw Cen MT" charset="0"/>
+                </a:rPr>
+                <a:t>Go for privilege escalation</a:t>
+              </a:r>
+              <a:endParaRPr lang="en-US" sz="1600" b="1" dirty="0">
+                <a:solidFill>
+                  <a:srgbClr val="FEF4F0"/>
+                </a:solidFill>
+                <a:latin typeface="Tw Cen MT" charset="0"/>
+                <a:ea typeface="Tw Cen MT" charset="0"/>
+                <a:cs typeface="Tw Cen MT" charset="0"/>
+              </a:endParaRPr>
+            </a:p>
+            <a:p>
+              <a:pPr marL="285750" indent="-285750">
+                <a:buFont typeface="Arial" charset="0"/>
+                <a:buChar char="•"/>
+              </a:pPr>
+              <a:r>
+                <a:rPr lang="en-US" sz="1600" b="1" dirty="0" smtClean="0">
+                  <a:solidFill>
+                    <a:srgbClr val="FEF4F0"/>
+                  </a:solidFill>
+                  <a:latin typeface="Tw Cen MT" charset="0"/>
+                  <a:ea typeface="Tw Cen MT" charset="0"/>
+                  <a:cs typeface="Tw Cen MT" charset="0"/>
+                </a:rPr>
+                <a:t>Post-Attack</a:t>
+              </a:r>
+            </a:p>
+            <a:p>
+              <a:pPr marL="742950" lvl="1" indent="-285750">
+                <a:buFont typeface="Arial" charset="0"/>
+                <a:buChar char="•"/>
+              </a:pPr>
+              <a:r>
+                <a:rPr lang="en-US" sz="1600" dirty="0" smtClean="0">
+                  <a:solidFill>
+                    <a:srgbClr val="FEF4F0"/>
+                  </a:solidFill>
+                  <a:latin typeface="Tw Cen MT" charset="0"/>
+                  <a:ea typeface="Tw Cen MT" charset="0"/>
+                  <a:cs typeface="Tw Cen MT" charset="0"/>
+                </a:rPr>
+                <a:t>Find some system information using auxiliary modules for example the network details.</a:t>
+              </a:r>
+            </a:p>
+            <a:p>
+              <a:pPr marL="742950" lvl="1" indent="-285750">
+                <a:buFont typeface="Arial" charset="0"/>
+                <a:buChar char="•"/>
+              </a:pPr>
+              <a:r>
+                <a:rPr lang="en-US" sz="1600" dirty="0" smtClean="0">
+                  <a:solidFill>
+                    <a:srgbClr val="FEF4F0"/>
+                  </a:solidFill>
+                  <a:latin typeface="Tw Cen MT" charset="0"/>
+                  <a:ea typeface="Tw Cen MT" charset="0"/>
+                  <a:cs typeface="Tw Cen MT" charset="0"/>
+                </a:rPr>
+                <a:t>Interact with registry and event log management to clean your tracks. </a:t>
+              </a:r>
+              <a:endParaRPr lang="en-US" sz="1600" dirty="0">
+                <a:solidFill>
+                  <a:srgbClr val="FEF4F0"/>
                 </a:solidFill>
                 <a:latin typeface="Tw Cen MT" charset="0"/>
                 <a:ea typeface="Tw Cen MT" charset="0"/>

</xml_diff>

<commit_message>
ppt complete for hacking
</commit_message>
<xml_diff>
--- a/Metasploit.pptx
+++ b/Metasploit.pptx
@@ -197,7 +197,7 @@
           <a:p>
             <a:fld id="{780D03CD-C28F-6D4F-8549-6E228DCCDA39}" type="datetimeFigureOut">
               <a:rPr lang="en-US" smtClean="0"/>
-              <a:t>2/28/18</a:t>
+              <a:t>3/1/18</a:t>
             </a:fld>
             <a:endParaRPr lang="en-US"/>
           </a:p>
@@ -680,7 +680,7 @@
           <a:p>
             <a:fld id="{84C96F59-D577-FA43-AC56-D4CAF65691F2}" type="datetimeFigureOut">
               <a:rPr lang="en-US" smtClean="0"/>
-              <a:t>2/28/18</a:t>
+              <a:t>3/1/18</a:t>
             </a:fld>
             <a:endParaRPr lang="en-US"/>
           </a:p>
@@ -850,7 +850,7 @@
           <a:p>
             <a:fld id="{84C96F59-D577-FA43-AC56-D4CAF65691F2}" type="datetimeFigureOut">
               <a:rPr lang="en-US" smtClean="0"/>
-              <a:t>2/28/18</a:t>
+              <a:t>3/1/18</a:t>
             </a:fld>
             <a:endParaRPr lang="en-US"/>
           </a:p>
@@ -1030,7 +1030,7 @@
           <a:p>
             <a:fld id="{84C96F59-D577-FA43-AC56-D4CAF65691F2}" type="datetimeFigureOut">
               <a:rPr lang="en-US" smtClean="0"/>
-              <a:t>2/28/18</a:t>
+              <a:t>3/1/18</a:t>
             </a:fld>
             <a:endParaRPr lang="en-US"/>
           </a:p>
@@ -1200,7 +1200,7 @@
           <a:p>
             <a:fld id="{84C96F59-D577-FA43-AC56-D4CAF65691F2}" type="datetimeFigureOut">
               <a:rPr lang="en-US" smtClean="0"/>
-              <a:t>2/28/18</a:t>
+              <a:t>3/1/18</a:t>
             </a:fld>
             <a:endParaRPr lang="en-US"/>
           </a:p>
@@ -1446,7 +1446,7 @@
           <a:p>
             <a:fld id="{84C96F59-D577-FA43-AC56-D4CAF65691F2}" type="datetimeFigureOut">
               <a:rPr lang="en-US" smtClean="0"/>
-              <a:t>2/28/18</a:t>
+              <a:t>3/1/18</a:t>
             </a:fld>
             <a:endParaRPr lang="en-US"/>
           </a:p>
@@ -1678,7 +1678,7 @@
           <a:p>
             <a:fld id="{84C96F59-D577-FA43-AC56-D4CAF65691F2}" type="datetimeFigureOut">
               <a:rPr lang="en-US" smtClean="0"/>
-              <a:t>2/28/18</a:t>
+              <a:t>3/1/18</a:t>
             </a:fld>
             <a:endParaRPr lang="en-US"/>
           </a:p>
@@ -2045,7 +2045,7 @@
           <a:p>
             <a:fld id="{84C96F59-D577-FA43-AC56-D4CAF65691F2}" type="datetimeFigureOut">
               <a:rPr lang="en-US" smtClean="0"/>
-              <a:t>2/28/18</a:t>
+              <a:t>3/1/18</a:t>
             </a:fld>
             <a:endParaRPr lang="en-US"/>
           </a:p>
@@ -2163,7 +2163,7 @@
           <a:p>
             <a:fld id="{84C96F59-D577-FA43-AC56-D4CAF65691F2}" type="datetimeFigureOut">
               <a:rPr lang="en-US" smtClean="0"/>
-              <a:t>2/28/18</a:t>
+              <a:t>3/1/18</a:t>
             </a:fld>
             <a:endParaRPr lang="en-US"/>
           </a:p>
@@ -2258,7 +2258,7 @@
           <a:p>
             <a:fld id="{84C96F59-D577-FA43-AC56-D4CAF65691F2}" type="datetimeFigureOut">
               <a:rPr lang="en-US" smtClean="0"/>
-              <a:t>2/28/18</a:t>
+              <a:t>3/1/18</a:t>
             </a:fld>
             <a:endParaRPr lang="en-US"/>
           </a:p>
@@ -2535,7 +2535,7 @@
           <a:p>
             <a:fld id="{84C96F59-D577-FA43-AC56-D4CAF65691F2}" type="datetimeFigureOut">
               <a:rPr lang="en-US" smtClean="0"/>
-              <a:t>2/28/18</a:t>
+              <a:t>3/1/18</a:t>
             </a:fld>
             <a:endParaRPr lang="en-US"/>
           </a:p>
@@ -2788,7 +2788,7 @@
           <a:p>
             <a:fld id="{84C96F59-D577-FA43-AC56-D4CAF65691F2}" type="datetimeFigureOut">
               <a:rPr lang="en-US" smtClean="0"/>
-              <a:t>2/28/18</a:t>
+              <a:t>3/1/18</a:t>
             </a:fld>
             <a:endParaRPr lang="en-US"/>
           </a:p>
@@ -3001,7 +3001,7 @@
           <a:p>
             <a:fld id="{84C96F59-D577-FA43-AC56-D4CAF65691F2}" type="datetimeFigureOut">
               <a:rPr lang="en-US" smtClean="0"/>
-              <a:t>2/28/18</a:t>
+              <a:t>3/1/18</a:t>
             </a:fld>
             <a:endParaRPr lang="en-US"/>
           </a:p>
@@ -3423,7 +3423,7 @@
         <p:spPr>
           <a:xfrm>
             <a:off x="7245546" y="1875305"/>
-            <a:ext cx="4336854" cy="2677656"/>
+            <a:ext cx="4336854" cy="3046988"/>
           </a:xfrm>
           <a:prstGeom prst="rect">
             <a:avLst/>
@@ -3491,7 +3491,31 @@
                 <a:ea typeface="Tw Cen MT" charset="0"/>
                 <a:cs typeface="Tw Cen MT" charset="0"/>
               </a:rPr>
-              <a:t>MANDEEP SARANGAL</a:t>
+              <a:t>MANDEEP </a:t>
+            </a:r>
+            <a:r>
+              <a:rPr lang="en-US" sz="2400" dirty="0" smtClean="0">
+                <a:solidFill>
+                  <a:srgbClr val="F8CDB0"/>
+                </a:solidFill>
+                <a:latin typeface="Tw Cen MT" charset="0"/>
+                <a:ea typeface="Tw Cen MT" charset="0"/>
+                <a:cs typeface="Tw Cen MT" charset="0"/>
+              </a:rPr>
+              <a:t>SARANGAL</a:t>
+            </a:r>
+          </a:p>
+          <a:p>
+            <a:r>
+              <a:rPr lang="en-US" sz="2400" dirty="0" smtClean="0">
+                <a:solidFill>
+                  <a:srgbClr val="F8CDB0"/>
+                </a:solidFill>
+                <a:latin typeface="Tw Cen MT" charset="0"/>
+                <a:ea typeface="Tw Cen MT" charset="0"/>
+                <a:cs typeface="Tw Cen MT" charset="0"/>
+              </a:rPr>
+              <a:t>251000108</a:t>
             </a:r>
             <a:endParaRPr lang="en-US" sz="2400" dirty="0">
               <a:solidFill>
@@ -3512,7 +3536,7 @@
         </p:nvGrpSpPr>
         <p:grpSpPr>
           <a:xfrm>
-            <a:off x="-5288550" y="0"/>
+            <a:off x="-5992757" y="0"/>
             <a:ext cx="11364686" cy="6858000"/>
             <a:chOff x="498898" y="0"/>
             <a:chExt cx="11364686" cy="6858000"/>
@@ -3700,7 +3724,7 @@
           </p:nvSpPr>
           <p:spPr>
             <a:xfrm>
-              <a:off x="5589789" y="1033743"/>
+              <a:off x="5757950" y="1033743"/>
               <a:ext cx="4245429" cy="5570756"/>
             </a:xfrm>
             <a:prstGeom prst="rect">
@@ -4036,7 +4060,7 @@
         </p:nvGrpSpPr>
         <p:grpSpPr>
           <a:xfrm>
-            <a:off x="-6096486" y="7694"/>
+            <a:off x="-6811205" y="7694"/>
             <a:ext cx="11364686" cy="6858000"/>
             <a:chOff x="-502587" y="0"/>
             <a:chExt cx="11364686" cy="6858000"/>
@@ -4450,7 +4474,7 @@
         </p:nvGrpSpPr>
         <p:grpSpPr>
           <a:xfrm>
-            <a:off x="-6911272" y="0"/>
+            <a:off x="-7636502" y="0"/>
             <a:ext cx="11364686" cy="6858000"/>
             <a:chOff x="-1449643" y="0"/>
             <a:chExt cx="11364686" cy="6858000"/>
@@ -4841,7 +4865,7 @@
         </p:nvGrpSpPr>
         <p:grpSpPr>
           <a:xfrm>
-            <a:off x="-7787293" y="0"/>
+            <a:off x="-8428441" y="0"/>
             <a:ext cx="11364686" cy="6858000"/>
             <a:chOff x="-3365531" y="0"/>
             <a:chExt cx="11364686" cy="6858000"/>
@@ -5266,7 +5290,7 @@
         </p:nvGrpSpPr>
         <p:grpSpPr>
           <a:xfrm>
-            <a:off x="-8673976" y="4878"/>
+            <a:off x="-9210018" y="4878"/>
             <a:ext cx="11364686" cy="6858000"/>
             <a:chOff x="-4301700" y="0"/>
             <a:chExt cx="11364686" cy="6858000"/>
@@ -5750,7 +5774,7 @@
         </p:nvGrpSpPr>
         <p:grpSpPr>
           <a:xfrm>
-            <a:off x="-9577473" y="15388"/>
+            <a:off x="-9987392" y="15388"/>
             <a:ext cx="11364686" cy="6858000"/>
             <a:chOff x="-4301700" y="0"/>
             <a:chExt cx="11364686" cy="6858000"/>
@@ -5930,7 +5954,7 @@
           </p:nvSpPr>
           <p:spPr>
             <a:xfrm>
-              <a:off x="-125185" y="2017958"/>
+              <a:off x="-125185" y="2617047"/>
               <a:ext cx="5070898" cy="830997"/>
             </a:xfrm>
             <a:prstGeom prst="rect">

</xml_diff>